<commit_message>
a few more small changes
</commit_message>
<xml_diff>
--- a/Sallary gap predictionfrom Project Demo.pptx
+++ b/Sallary gap predictionfrom Project Demo.pptx
@@ -113,7 +113,7 @@
   </p:defaultTextStyle>
   <p:extLst>
     <p:ext uri="{EFAFB233-063F-42B5-8137-9DF3F51BA10A}">
-      <p15:sldGuideLst xmlns:p15="http://schemas.microsoft.com/office/powerpoint/2012/main"/>
+      <p15:sldGuideLst xmlns:p15="http://schemas.microsoft.com/office/powerpoint/2012/main" xmlns=""/>
     </p:ext>
   </p:extLst>
 </p:presentation>
@@ -156,7 +156,7 @@
             <a:avLst/>
           </a:prstGeom>
           <a:blipFill dpi="0" rotWithShape="1">
-            <a:blip r:embed="rId2">
+            <a:blip r:embed="rId2" cstate="print">
               <a:alphaModFix amt="45000"/>
               <a:duotone>
                 <a:schemeClr val="accent1">
@@ -581,6 +581,7 @@
           <a:p>
             <a:fld id="{DCCFA427-BB50-4F8D-8FC4-B0EA0BA5795C}" type="datetimeFigureOut">
               <a:rPr lang="en-US" smtClean="0"/>
+              <a:pPr/>
               <a:t>12/5/2016</a:t>
             </a:fld>
             <a:endParaRPr lang="en-US"/>
@@ -655,6 +656,7 @@
           <a:p>
             <a:fld id="{7992E1F9-4F47-4E28-98B1-B5BC2AC5DF2F}" type="slidenum">
               <a:rPr lang="en-US" smtClean="0"/>
+              <a:pPr/>
               <a:t>‹#›</a:t>
             </a:fld>
             <a:endParaRPr lang="en-US"/>
@@ -664,7 +666,7 @@
     </p:spTree>
     <p:extLst>
       <p:ext uri="{BB962C8B-B14F-4D97-AF65-F5344CB8AC3E}">
-        <p14:creationId xmlns:p14="http://schemas.microsoft.com/office/powerpoint/2010/main" val="254611623"/>
+        <p14:creationId xmlns:p14="http://schemas.microsoft.com/office/powerpoint/2010/main" xmlns="" val="254611623"/>
       </p:ext>
     </p:extLst>
   </p:cSld>
@@ -783,6 +785,7 @@
           <a:p>
             <a:fld id="{DCCFA427-BB50-4F8D-8FC4-B0EA0BA5795C}" type="datetimeFigureOut">
               <a:rPr lang="en-US" smtClean="0"/>
+              <a:pPr/>
               <a:t>12/5/2016</a:t>
             </a:fld>
             <a:endParaRPr lang="en-US"/>
@@ -825,6 +828,7 @@
           <a:p>
             <a:fld id="{7992E1F9-4F47-4E28-98B1-B5BC2AC5DF2F}" type="slidenum">
               <a:rPr lang="en-US" smtClean="0"/>
+              <a:pPr/>
               <a:t>‹#›</a:t>
             </a:fld>
             <a:endParaRPr lang="en-US"/>
@@ -834,7 +838,7 @@
     </p:spTree>
     <p:extLst>
       <p:ext uri="{BB962C8B-B14F-4D97-AF65-F5344CB8AC3E}">
-        <p14:creationId xmlns:p14="http://schemas.microsoft.com/office/powerpoint/2010/main" val="2716736531"/>
+        <p14:creationId xmlns:p14="http://schemas.microsoft.com/office/powerpoint/2010/main" xmlns="" val="2716736531"/>
       </p:ext>
     </p:extLst>
   </p:cSld>
@@ -963,6 +967,7 @@
           <a:p>
             <a:fld id="{DCCFA427-BB50-4F8D-8FC4-B0EA0BA5795C}" type="datetimeFigureOut">
               <a:rPr lang="en-US" smtClean="0"/>
+              <a:pPr/>
               <a:t>12/5/2016</a:t>
             </a:fld>
             <a:endParaRPr lang="en-US"/>
@@ -1005,6 +1010,7 @@
           <a:p>
             <a:fld id="{7992E1F9-4F47-4E28-98B1-B5BC2AC5DF2F}" type="slidenum">
               <a:rPr lang="en-US" smtClean="0"/>
+              <a:pPr/>
               <a:t>‹#›</a:t>
             </a:fld>
             <a:endParaRPr lang="en-US"/>
@@ -1014,7 +1020,7 @@
     </p:spTree>
     <p:extLst>
       <p:ext uri="{BB962C8B-B14F-4D97-AF65-F5344CB8AC3E}">
-        <p14:creationId xmlns:p14="http://schemas.microsoft.com/office/powerpoint/2010/main" val="2604561829"/>
+        <p14:creationId xmlns:p14="http://schemas.microsoft.com/office/powerpoint/2010/main" xmlns="" val="2604561829"/>
       </p:ext>
     </p:extLst>
   </p:cSld>
@@ -1133,6 +1139,7 @@
           <a:p>
             <a:fld id="{DCCFA427-BB50-4F8D-8FC4-B0EA0BA5795C}" type="datetimeFigureOut">
               <a:rPr lang="en-US" smtClean="0"/>
+              <a:pPr/>
               <a:t>12/5/2016</a:t>
             </a:fld>
             <a:endParaRPr lang="en-US"/>
@@ -1175,6 +1182,7 @@
           <a:p>
             <a:fld id="{7992E1F9-4F47-4E28-98B1-B5BC2AC5DF2F}" type="slidenum">
               <a:rPr lang="en-US" smtClean="0"/>
+              <a:pPr/>
               <a:t>‹#›</a:t>
             </a:fld>
             <a:endParaRPr lang="en-US"/>
@@ -1184,7 +1192,7 @@
     </p:spTree>
     <p:extLst>
       <p:ext uri="{BB962C8B-B14F-4D97-AF65-F5344CB8AC3E}">
-        <p14:creationId xmlns:p14="http://schemas.microsoft.com/office/powerpoint/2010/main" val="2263785529"/>
+        <p14:creationId xmlns:p14="http://schemas.microsoft.com/office/powerpoint/2010/main" xmlns="" val="2263785529"/>
       </p:ext>
     </p:extLst>
   </p:cSld>
@@ -1231,7 +1239,7 @@
             <a:avLst/>
           </a:prstGeom>
           <a:blipFill dpi="0" rotWithShape="1">
-            <a:blip r:embed="rId2">
+            <a:blip r:embed="rId2" cstate="print">
               <a:alphaModFix amt="45000"/>
               <a:duotone>
                 <a:schemeClr val="accent2">
@@ -1704,6 +1712,7 @@
           <a:p>
             <a:fld id="{DCCFA427-BB50-4F8D-8FC4-B0EA0BA5795C}" type="datetimeFigureOut">
               <a:rPr lang="en-US" smtClean="0"/>
+              <a:pPr/>
               <a:t>12/5/2016</a:t>
             </a:fld>
             <a:endParaRPr lang="en-US"/>
@@ -1760,6 +1769,7 @@
           <a:p>
             <a:fld id="{7992E1F9-4F47-4E28-98B1-B5BC2AC5DF2F}" type="slidenum">
               <a:rPr lang="en-US" smtClean="0"/>
+              <a:pPr/>
               <a:t>‹#›</a:t>
             </a:fld>
             <a:endParaRPr lang="en-US"/>
@@ -1769,7 +1779,7 @@
     </p:spTree>
     <p:extLst>
       <p:ext uri="{BB962C8B-B14F-4D97-AF65-F5344CB8AC3E}">
-        <p14:creationId xmlns:p14="http://schemas.microsoft.com/office/powerpoint/2010/main" val="1591096940"/>
+        <p14:creationId xmlns:p14="http://schemas.microsoft.com/office/powerpoint/2010/main" xmlns="" val="1591096940"/>
       </p:ext>
     </p:extLst>
   </p:cSld>
@@ -2006,6 +2016,7 @@
           <a:p>
             <a:fld id="{DCCFA427-BB50-4F8D-8FC4-B0EA0BA5795C}" type="datetimeFigureOut">
               <a:rPr lang="en-US" smtClean="0"/>
+              <a:pPr/>
               <a:t>12/5/2016</a:t>
             </a:fld>
             <a:endParaRPr lang="en-US"/>
@@ -2048,6 +2059,7 @@
           <a:p>
             <a:fld id="{7992E1F9-4F47-4E28-98B1-B5BC2AC5DF2F}" type="slidenum">
               <a:rPr lang="en-US" smtClean="0"/>
+              <a:pPr/>
               <a:t>‹#›</a:t>
             </a:fld>
             <a:endParaRPr lang="en-US"/>
@@ -2057,7 +2069,7 @@
     </p:spTree>
     <p:extLst>
       <p:ext uri="{BB962C8B-B14F-4D97-AF65-F5344CB8AC3E}">
-        <p14:creationId xmlns:p14="http://schemas.microsoft.com/office/powerpoint/2010/main" val="4104223766"/>
+        <p14:creationId xmlns:p14="http://schemas.microsoft.com/office/powerpoint/2010/main" xmlns="" val="4104223766"/>
       </p:ext>
     </p:extLst>
   </p:cSld>
@@ -2443,6 +2455,7 @@
           <a:p>
             <a:fld id="{DCCFA427-BB50-4F8D-8FC4-B0EA0BA5795C}" type="datetimeFigureOut">
               <a:rPr lang="en-US" smtClean="0"/>
+              <a:pPr/>
               <a:t>12/5/2016</a:t>
             </a:fld>
             <a:endParaRPr lang="en-US"/>
@@ -2485,6 +2498,7 @@
           <a:p>
             <a:fld id="{7992E1F9-4F47-4E28-98B1-B5BC2AC5DF2F}" type="slidenum">
               <a:rPr lang="en-US" smtClean="0"/>
+              <a:pPr/>
               <a:t>‹#›</a:t>
             </a:fld>
             <a:endParaRPr lang="en-US"/>
@@ -2494,7 +2508,7 @@
     </p:spTree>
     <p:extLst>
       <p:ext uri="{BB962C8B-B14F-4D97-AF65-F5344CB8AC3E}">
-        <p14:creationId xmlns:p14="http://schemas.microsoft.com/office/powerpoint/2010/main" val="2670169739"/>
+        <p14:creationId xmlns:p14="http://schemas.microsoft.com/office/powerpoint/2010/main" xmlns="" val="2670169739"/>
       </p:ext>
     </p:extLst>
   </p:cSld>
@@ -2561,6 +2575,7 @@
           <a:p>
             <a:fld id="{DCCFA427-BB50-4F8D-8FC4-B0EA0BA5795C}" type="datetimeFigureOut">
               <a:rPr lang="en-US" smtClean="0"/>
+              <a:pPr/>
               <a:t>12/5/2016</a:t>
             </a:fld>
             <a:endParaRPr lang="en-US"/>
@@ -2603,6 +2618,7 @@
           <a:p>
             <a:fld id="{7992E1F9-4F47-4E28-98B1-B5BC2AC5DF2F}" type="slidenum">
               <a:rPr lang="en-US" smtClean="0"/>
+              <a:pPr/>
               <a:t>‹#›</a:t>
             </a:fld>
             <a:endParaRPr lang="en-US"/>
@@ -2612,7 +2628,7 @@
     </p:spTree>
     <p:extLst>
       <p:ext uri="{BB962C8B-B14F-4D97-AF65-F5344CB8AC3E}">
-        <p14:creationId xmlns:p14="http://schemas.microsoft.com/office/powerpoint/2010/main" val="1477665264"/>
+        <p14:creationId xmlns:p14="http://schemas.microsoft.com/office/powerpoint/2010/main" xmlns="" val="1477665264"/>
       </p:ext>
     </p:extLst>
   </p:cSld>
@@ -2656,6 +2672,7 @@
           <a:p>
             <a:fld id="{DCCFA427-BB50-4F8D-8FC4-B0EA0BA5795C}" type="datetimeFigureOut">
               <a:rPr lang="en-US" smtClean="0"/>
+              <a:pPr/>
               <a:t>12/5/2016</a:t>
             </a:fld>
             <a:endParaRPr lang="en-US"/>
@@ -2698,6 +2715,7 @@
           <a:p>
             <a:fld id="{7992E1F9-4F47-4E28-98B1-B5BC2AC5DF2F}" type="slidenum">
               <a:rPr lang="en-US" smtClean="0"/>
+              <a:pPr/>
               <a:t>‹#›</a:t>
             </a:fld>
             <a:endParaRPr lang="en-US"/>
@@ -2707,7 +2725,7 @@
     </p:spTree>
     <p:extLst>
       <p:ext uri="{BB962C8B-B14F-4D97-AF65-F5344CB8AC3E}">
-        <p14:creationId xmlns:p14="http://schemas.microsoft.com/office/powerpoint/2010/main" val="2711781868"/>
+        <p14:creationId xmlns:p14="http://schemas.microsoft.com/office/powerpoint/2010/main" xmlns="" val="2711781868"/>
       </p:ext>
     </p:extLst>
   </p:cSld>
@@ -3038,6 +3056,7 @@
           <a:p>
             <a:fld id="{DCCFA427-BB50-4F8D-8FC4-B0EA0BA5795C}" type="datetimeFigureOut">
               <a:rPr lang="en-US" smtClean="0"/>
+              <a:pPr/>
               <a:t>12/5/2016</a:t>
             </a:fld>
             <a:endParaRPr lang="en-US"/>
@@ -3097,6 +3116,7 @@
           <a:p>
             <a:fld id="{7992E1F9-4F47-4E28-98B1-B5BC2AC5DF2F}" type="slidenum">
               <a:rPr lang="en-US" smtClean="0"/>
+              <a:pPr/>
               <a:t>‹#›</a:t>
             </a:fld>
             <a:endParaRPr lang="en-US"/>
@@ -3145,7 +3165,7 @@
     </p:spTree>
     <p:extLst>
       <p:ext uri="{BB962C8B-B14F-4D97-AF65-F5344CB8AC3E}">
-        <p14:creationId xmlns:p14="http://schemas.microsoft.com/office/powerpoint/2010/main" val="1977218180"/>
+        <p14:creationId xmlns:p14="http://schemas.microsoft.com/office/powerpoint/2010/main" xmlns="" val="1977218180"/>
       </p:ext>
     </p:extLst>
   </p:cSld>
@@ -3432,6 +3452,7 @@
           <a:p>
             <a:fld id="{DCCFA427-BB50-4F8D-8FC4-B0EA0BA5795C}" type="datetimeFigureOut">
               <a:rPr lang="en-US" smtClean="0"/>
+              <a:pPr/>
               <a:t>12/5/2016</a:t>
             </a:fld>
             <a:endParaRPr lang="en-US"/>
@@ -3505,6 +3526,7 @@
           <a:p>
             <a:fld id="{7992E1F9-4F47-4E28-98B1-B5BC2AC5DF2F}" type="slidenum">
               <a:rPr lang="en-US" smtClean="0"/>
+              <a:pPr/>
               <a:t>‹#›</a:t>
             </a:fld>
             <a:endParaRPr lang="en-US"/>
@@ -3553,7 +3575,7 @@
     </p:spTree>
     <p:extLst>
       <p:ext uri="{BB962C8B-B14F-4D97-AF65-F5344CB8AC3E}">
-        <p14:creationId xmlns:p14="http://schemas.microsoft.com/office/powerpoint/2010/main" val="2602728310"/>
+        <p14:creationId xmlns:p14="http://schemas.microsoft.com/office/powerpoint/2010/main" xmlns="" val="2602728310"/>
       </p:ext>
     </p:extLst>
   </p:cSld>
@@ -3745,6 +3767,7 @@
           <a:p>
             <a:fld id="{DCCFA427-BB50-4F8D-8FC4-B0EA0BA5795C}" type="datetimeFigureOut">
               <a:rPr lang="en-US" smtClean="0"/>
+              <a:pPr/>
               <a:t>12/5/2016</a:t>
             </a:fld>
             <a:endParaRPr lang="en-US"/>
@@ -3825,6 +3848,7 @@
           <a:p>
             <a:fld id="{7992E1F9-4F47-4E28-98B1-B5BC2AC5DF2F}" type="slidenum">
               <a:rPr lang="en-US" smtClean="0"/>
+              <a:pPr/>
               <a:t>‹#›</a:t>
             </a:fld>
             <a:endParaRPr lang="en-US"/>
@@ -3834,7 +3858,7 @@
     </p:spTree>
     <p:extLst>
       <p:ext uri="{BB962C8B-B14F-4D97-AF65-F5344CB8AC3E}">
-        <p14:creationId xmlns:p14="http://schemas.microsoft.com/office/powerpoint/2010/main" val="4097071133"/>
+        <p14:creationId xmlns:p14="http://schemas.microsoft.com/office/powerpoint/2010/main" xmlns="" val="4097071133"/>
       </p:ext>
     </p:extLst>
   </p:cSld>
@@ -4313,7 +4337,7 @@
     </p:spTree>
     <p:extLst>
       <p:ext uri="{BB962C8B-B14F-4D97-AF65-F5344CB8AC3E}">
-        <p14:creationId xmlns:p14="http://schemas.microsoft.com/office/powerpoint/2010/main" val="3364559204"/>
+        <p14:creationId xmlns:p14="http://schemas.microsoft.com/office/powerpoint/2010/main" xmlns="" val="3364559204"/>
       </p:ext>
     </p:extLst>
   </p:cSld>
@@ -4449,7 +4473,7 @@
     </p:spTree>
     <p:extLst>
       <p:ext uri="{BB962C8B-B14F-4D97-AF65-F5344CB8AC3E}">
-        <p14:creationId xmlns:p14="http://schemas.microsoft.com/office/powerpoint/2010/main" val="488657827"/>
+        <p14:creationId xmlns:p14="http://schemas.microsoft.com/office/powerpoint/2010/main" xmlns="" val="488657827"/>
       </p:ext>
     </p:extLst>
   </p:cSld>
@@ -4556,7 +4580,7 @@
     </p:spTree>
     <p:extLst>
       <p:ext uri="{BB962C8B-B14F-4D97-AF65-F5344CB8AC3E}">
-        <p14:creationId xmlns:p14="http://schemas.microsoft.com/office/powerpoint/2010/main" val="184644264"/>
+        <p14:creationId xmlns:p14="http://schemas.microsoft.com/office/powerpoint/2010/main" xmlns="" val="184644264"/>
       </p:ext>
     </p:extLst>
   </p:cSld>
@@ -4636,7 +4660,7 @@
     </p:spTree>
     <p:extLst>
       <p:ext uri="{BB962C8B-B14F-4D97-AF65-F5344CB8AC3E}">
-        <p14:creationId xmlns:p14="http://schemas.microsoft.com/office/powerpoint/2010/main" val="1136635159"/>
+        <p14:creationId xmlns:p14="http://schemas.microsoft.com/office/powerpoint/2010/main" xmlns="" val="1136635159"/>
       </p:ext>
     </p:extLst>
   </p:cSld>
@@ -4701,14 +4725,76 @@
           <a:bodyPr/>
           <a:lstStyle/>
           <a:p>
-            <a:endParaRPr lang="en-US"/>
+            <a:r>
+              <a:rPr lang="en-US" dirty="0" smtClean="0"/>
+              <a:t>Column arrangements (countries – flatten </a:t>
+            </a:r>
+            <a:r>
+              <a:rPr lang="en-US" dirty="0" err="1" smtClean="0"/>
+              <a:t>categorials</a:t>
+            </a:r>
+            <a:r>
+              <a:rPr lang="en-US" dirty="0" smtClean="0"/>
+              <a:t>, years – equal </a:t>
+            </a:r>
+            <a:r>
+              <a:rPr lang="en-US" dirty="0" err="1" smtClean="0"/>
+              <a:t>framents</a:t>
+            </a:r>
+            <a:r>
+              <a:rPr lang="en-US" dirty="0" smtClean="0"/>
+              <a:t>)</a:t>
+            </a:r>
+          </a:p>
+          <a:p>
+            <a:r>
+              <a:rPr lang="en-US" dirty="0" smtClean="0"/>
+              <a:t>Normalizing –  (Value-min(value)) / (max(value)-min(value))</a:t>
+            </a:r>
+          </a:p>
+          <a:p>
+            <a:r>
+              <a:rPr lang="en-US" dirty="0" smtClean="0"/>
+              <a:t>Missing values:</a:t>
+            </a:r>
+          </a:p>
+          <a:p>
+            <a:pPr lvl="1"/>
+            <a:r>
+              <a:rPr lang="en-US" dirty="0" smtClean="0"/>
+              <a:t>Too many!</a:t>
+            </a:r>
+          </a:p>
+          <a:p>
+            <a:pPr lvl="1"/>
+            <a:r>
+              <a:rPr lang="en-US" dirty="0" smtClean="0"/>
+              <a:t>First removing the sparse ones without mining context (under XXX percent)</a:t>
+            </a:r>
+          </a:p>
+          <a:p>
+            <a:pPr lvl="1"/>
+            <a:r>
+              <a:rPr lang="en-US" dirty="0" smtClean="0"/>
+              <a:t>First version:  median</a:t>
+            </a:r>
+          </a:p>
+          <a:p>
+            <a:pPr lvl="1"/>
+            <a:r>
+              <a:rPr lang="en-US" dirty="0" smtClean="0"/>
+              <a:t>Second version: finding similar countries with similar values </a:t>
+            </a:r>
+          </a:p>
+          <a:p>
+            <a:endParaRPr lang="en-US" dirty="0"/>
           </a:p>
         </p:txBody>
       </p:sp>
     </p:spTree>
     <p:extLst>
       <p:ext uri="{BB962C8B-B14F-4D97-AF65-F5344CB8AC3E}">
-        <p14:creationId xmlns:p14="http://schemas.microsoft.com/office/powerpoint/2010/main" val="3021417476"/>
+        <p14:creationId xmlns:p14="http://schemas.microsoft.com/office/powerpoint/2010/main" xmlns="" val="3021417476"/>
       </p:ext>
     </p:extLst>
   </p:cSld>
@@ -4758,43 +4844,53 @@
             </a:r>
             <a:r>
               <a:rPr lang="en-US" dirty="0" smtClean="0"/>
-              <a:t>problem </a:t>
-            </a:r>
+              <a:t>problem Product output</a:t>
+            </a:r>
+            <a:endParaRPr lang="en-US" dirty="0"/>
+          </a:p>
+        </p:txBody>
+      </p:sp>
+      <p:sp>
+        <p:nvSpPr>
+          <p:cNvPr id="3" name="Content Placeholder 2"/>
+          <p:cNvSpPr>
+            <a:spLocks noGrp="1"/>
+          </p:cNvSpPr>
+          <p:nvPr>
+            <p:ph idx="1"/>
+          </p:nvPr>
+        </p:nvSpPr>
+        <p:spPr/>
+        <p:txBody>
+          <a:bodyPr/>
+          <a:lstStyle/>
+          <a:p>
             <a:r>
               <a:rPr lang="en-US" dirty="0" smtClean="0"/>
-              <a:t>Product </a:t>
-            </a:r>
+              <a:t>Predicting average gender wage gap in the OECD</a:t>
+            </a:r>
+          </a:p>
+          <a:p>
             <a:r>
               <a:rPr lang="en-US" dirty="0" smtClean="0"/>
-              <a:t>output</a:t>
+              <a:t>Will calculate for each state and average them </a:t>
+            </a:r>
+            <a:r>
+              <a:rPr lang="en-US" dirty="0" err="1" smtClean="0"/>
+              <a:t>deterministicly</a:t>
+            </a:r>
+            <a:r>
+              <a:rPr lang="en-US" dirty="0" smtClean="0"/>
+              <a:t> (for unbiased estimates – immediate variance reduction)</a:t>
             </a:r>
             <a:endParaRPr lang="en-US" dirty="0"/>
-          </a:p>
-        </p:txBody>
-      </p:sp>
-      <p:sp>
-        <p:nvSpPr>
-          <p:cNvPr id="3" name="Content Placeholder 2"/>
-          <p:cNvSpPr>
-            <a:spLocks noGrp="1"/>
-          </p:cNvSpPr>
-          <p:nvPr>
-            <p:ph idx="1"/>
-          </p:nvPr>
-        </p:nvSpPr>
-        <p:spPr/>
-        <p:txBody>
-          <a:bodyPr/>
-          <a:lstStyle/>
-          <a:p>
-            <a:endParaRPr lang="en-US"/>
           </a:p>
         </p:txBody>
       </p:sp>
     </p:spTree>
     <p:extLst>
       <p:ext uri="{BB962C8B-B14F-4D97-AF65-F5344CB8AC3E}">
-        <p14:creationId xmlns:p14="http://schemas.microsoft.com/office/powerpoint/2010/main" val="2506240783"/>
+        <p14:creationId xmlns:p14="http://schemas.microsoft.com/office/powerpoint/2010/main" xmlns="" val="2506240783"/>
       </p:ext>
     </p:extLst>
   </p:cSld>
@@ -4859,14 +4955,18 @@
           <a:bodyPr/>
           <a:lstStyle/>
           <a:p>
-            <a:endParaRPr lang="en-US"/>
+            <a:r>
+              <a:rPr lang="en-US" dirty="0" smtClean="0"/>
+              <a:t>Missing Values!</a:t>
+            </a:r>
+            <a:endParaRPr lang="en-US" dirty="0"/>
           </a:p>
         </p:txBody>
       </p:sp>
     </p:spTree>
     <p:extLst>
       <p:ext uri="{BB962C8B-B14F-4D97-AF65-F5344CB8AC3E}">
-        <p14:creationId xmlns:p14="http://schemas.microsoft.com/office/powerpoint/2010/main" val="1864583965"/>
+        <p14:creationId xmlns:p14="http://schemas.microsoft.com/office/powerpoint/2010/main" xmlns="" val="1864583965"/>
       </p:ext>
     </p:extLst>
   </p:cSld>
@@ -4931,14 +5031,122 @@
           <a:bodyPr/>
           <a:lstStyle/>
           <a:p>
-            <a:endParaRPr lang="en-US"/>
-          </a:p>
-        </p:txBody>
-      </p:sp>
+            <a:r>
+              <a:rPr lang="en-US" dirty="0" smtClean="0"/>
+              <a:t>Business understanding, Data understanding – done</a:t>
+            </a:r>
+          </a:p>
+          <a:p>
+            <a:r>
+              <a:rPr lang="en-US" dirty="0" smtClean="0"/>
+              <a:t>Data </a:t>
+            </a:r>
+            <a:r>
+              <a:rPr lang="en-US" dirty="0" err="1" smtClean="0"/>
+              <a:t>preperation</a:t>
+            </a:r>
+            <a:r>
+              <a:rPr lang="en-US" dirty="0" smtClean="0"/>
+              <a:t> – as stated</a:t>
+            </a:r>
+          </a:p>
+          <a:p>
+            <a:r>
+              <a:rPr lang="en-US" dirty="0" smtClean="0"/>
+              <a:t>Modeling  and Evaluating</a:t>
+            </a:r>
+          </a:p>
+          <a:p>
+            <a:pPr lvl="1"/>
+            <a:r>
+              <a:rPr lang="en-US" dirty="0" smtClean="0"/>
+              <a:t>Step 1: simple linear regression. T-test based feature Removing (manually)?</a:t>
+            </a:r>
+          </a:p>
+          <a:p>
+            <a:pPr lvl="1"/>
+            <a:r>
+              <a:rPr lang="en-US" dirty="0" smtClean="0"/>
+              <a:t>Step 2: L1 regularization for feature </a:t>
+            </a:r>
+            <a:r>
+              <a:rPr lang="en-US" dirty="0" err="1" smtClean="0"/>
+              <a:t>selction</a:t>
+            </a:r>
+            <a:r>
+              <a:rPr lang="en-US" dirty="0" smtClean="0"/>
+              <a:t>(lambda by cross validation)</a:t>
+            </a:r>
+            <a:endParaRPr lang="en-US" dirty="0" smtClean="0"/>
+          </a:p>
+          <a:p>
+            <a:pPr lvl="1"/>
+            <a:r>
+              <a:rPr lang="en-US" dirty="0" smtClean="0"/>
+              <a:t>Step 3: data </a:t>
+            </a:r>
+            <a:r>
+              <a:rPr lang="en-US" dirty="0" err="1" smtClean="0"/>
+              <a:t>maninpulation</a:t>
+            </a:r>
+            <a:r>
+              <a:rPr lang="en-US" dirty="0" smtClean="0"/>
+              <a:t> status – </a:t>
+            </a:r>
+          </a:p>
+          <a:p>
+            <a:pPr lvl="2"/>
+            <a:r>
+              <a:rPr lang="en-US" dirty="0" smtClean="0"/>
+              <a:t>considering cross terms and different missing values system</a:t>
+            </a:r>
+            <a:endParaRPr lang="en-US" dirty="0"/>
+          </a:p>
+          <a:p>
+            <a:pPr lvl="1"/>
+            <a:r>
+              <a:rPr lang="en-US" dirty="0" smtClean="0"/>
+              <a:t>Step 4: considering usage of Random Forest or SVM</a:t>
+            </a:r>
+          </a:p>
+        </p:txBody>
+      </p:sp>
+      <p:pic>
+        <p:nvPicPr>
+          <p:cNvPr id="4" name="Picture 2"/>
+          <p:cNvPicPr>
+            <a:picLocks noChangeAspect="1" noChangeArrowheads="1"/>
+          </p:cNvPicPr>
+          <p:nvPr/>
+        </p:nvPicPr>
+        <p:blipFill>
+          <a:blip r:embed="rId2" cstate="print"/>
+          <a:srcRect/>
+          <a:stretch>
+            <a:fillRect/>
+          </a:stretch>
+        </p:blipFill>
+        <p:spPr bwMode="auto">
+          <a:xfrm>
+            <a:off x="9023472" y="4519749"/>
+            <a:ext cx="3168527" cy="2338251"/>
+          </a:xfrm>
+          <a:prstGeom prst="rect">
+            <a:avLst/>
+          </a:prstGeom>
+          <a:noFill/>
+          <a:ln w="9525">
+            <a:noFill/>
+            <a:miter lim="800000"/>
+            <a:headEnd/>
+            <a:tailEnd/>
+          </a:ln>
+        </p:spPr>
+      </p:pic>
     </p:spTree>
     <p:extLst>
       <p:ext uri="{BB962C8B-B14F-4D97-AF65-F5344CB8AC3E}">
-        <p14:creationId xmlns:p14="http://schemas.microsoft.com/office/powerpoint/2010/main" val="1364573028"/>
+        <p14:creationId xmlns:p14="http://schemas.microsoft.com/office/powerpoint/2010/main" xmlns="" val="1364573028"/>
       </p:ext>
     </p:extLst>
   </p:cSld>
@@ -4991,7 +5199,7 @@
     </a:clrScheme>
     <a:fontScheme name="Savon">
       <a:majorFont>
-        <a:latin typeface="Century Gothic" panose="020B0502020202020204"/>
+        <a:latin typeface="Century Gothic"/>
         <a:ea typeface=""/>
         <a:cs typeface=""/>
         <a:font script="Jpan" typeface="ＭＳ ゴシック"/>
@@ -5026,7 +5234,7 @@
         <a:font script="Geor" typeface="Sylfaen"/>
       </a:majorFont>
       <a:minorFont>
-        <a:latin typeface="Century Gothic" panose="020B0502020202020204"/>
+        <a:latin typeface="Century Gothic"/>
         <a:ea typeface=""/>
         <a:cs typeface=""/>
         <a:font script="Jpan" typeface="ＭＳ ゴシック"/>
@@ -5223,7 +5431,7 @@
   <a:extraClrSchemeLst/>
   <a:extLst>
     <a:ext uri="{05A4C25C-085E-4340-85A3-A5531E510DB2}">
-      <thm15:themeFamily xmlns:thm15="http://schemas.microsoft.com/office/thememl/2012/main" name="Savon" id="{1306E473-ED32-493B-A2D0-240A757EDD34}" vid="{C20BADFE-D095-436F-9677-9264042809F0}"/>
+      <thm15:themeFamily xmlns:thm15="http://schemas.microsoft.com/office/thememl/2012/main" xmlns="" name="Savon" id="{1306E473-ED32-493B-A2D0-240A757EDD34}" vid="{C20BADFE-D095-436F-9677-9264042809F0}"/>
     </a:ext>
   </a:extLst>
 </a:theme>

</xml_diff>

<commit_message>
some changes to the presentation
</commit_message>
<xml_diff>
--- a/Sallary gap predictionfrom Project Demo.pptx
+++ b/Sallary gap predictionfrom Project Demo.pptx
@@ -595,7 +595,7 @@
             <a:fld id="{DCCFA427-BB50-4F8D-8FC4-B0EA0BA5795C}" type="datetimeFigureOut">
               <a:rPr lang="en-US" smtClean="0"/>
               <a:pPr/>
-              <a:t>12/7/2016</a:t>
+              <a:t>07/12/2016</a:t>
             </a:fld>
             <a:endParaRPr lang="en-US"/>
           </a:p>
@@ -799,7 +799,7 @@
             <a:fld id="{DCCFA427-BB50-4F8D-8FC4-B0EA0BA5795C}" type="datetimeFigureOut">
               <a:rPr lang="en-US" smtClean="0"/>
               <a:pPr/>
-              <a:t>12/7/2016</a:t>
+              <a:t>07/12/2016</a:t>
             </a:fld>
             <a:endParaRPr lang="en-US"/>
           </a:p>
@@ -981,7 +981,7 @@
             <a:fld id="{DCCFA427-BB50-4F8D-8FC4-B0EA0BA5795C}" type="datetimeFigureOut">
               <a:rPr lang="en-US" smtClean="0"/>
               <a:pPr/>
-              <a:t>12/7/2016</a:t>
+              <a:t>07/12/2016</a:t>
             </a:fld>
             <a:endParaRPr lang="en-US"/>
           </a:p>
@@ -1153,7 +1153,7 @@
             <a:fld id="{DCCFA427-BB50-4F8D-8FC4-B0EA0BA5795C}" type="datetimeFigureOut">
               <a:rPr lang="en-US" smtClean="0"/>
               <a:pPr/>
-              <a:t>12/7/2016</a:t>
+              <a:t>07/12/2016</a:t>
             </a:fld>
             <a:endParaRPr lang="en-US"/>
           </a:p>
@@ -1726,7 +1726,7 @@
             <a:fld id="{DCCFA427-BB50-4F8D-8FC4-B0EA0BA5795C}" type="datetimeFigureOut">
               <a:rPr lang="en-US" smtClean="0"/>
               <a:pPr/>
-              <a:t>12/7/2016</a:t>
+              <a:t>07/12/2016</a:t>
             </a:fld>
             <a:endParaRPr lang="en-US"/>
           </a:p>
@@ -2030,7 +2030,7 @@
             <a:fld id="{DCCFA427-BB50-4F8D-8FC4-B0EA0BA5795C}" type="datetimeFigureOut">
               <a:rPr lang="en-US" smtClean="0"/>
               <a:pPr/>
-              <a:t>12/7/2016</a:t>
+              <a:t>07/12/2016</a:t>
             </a:fld>
             <a:endParaRPr lang="en-US"/>
           </a:p>
@@ -2469,7 +2469,7 @@
             <a:fld id="{DCCFA427-BB50-4F8D-8FC4-B0EA0BA5795C}" type="datetimeFigureOut">
               <a:rPr lang="en-US" smtClean="0"/>
               <a:pPr/>
-              <a:t>12/7/2016</a:t>
+              <a:t>07/12/2016</a:t>
             </a:fld>
             <a:endParaRPr lang="en-US"/>
           </a:p>
@@ -2589,7 +2589,7 @@
             <a:fld id="{DCCFA427-BB50-4F8D-8FC4-B0EA0BA5795C}" type="datetimeFigureOut">
               <a:rPr lang="en-US" smtClean="0"/>
               <a:pPr/>
-              <a:t>12/7/2016</a:t>
+              <a:t>07/12/2016</a:t>
             </a:fld>
             <a:endParaRPr lang="en-US"/>
           </a:p>
@@ -2686,7 +2686,7 @@
             <a:fld id="{DCCFA427-BB50-4F8D-8FC4-B0EA0BA5795C}" type="datetimeFigureOut">
               <a:rPr lang="en-US" smtClean="0"/>
               <a:pPr/>
-              <a:t>12/7/2016</a:t>
+              <a:t>07/12/2016</a:t>
             </a:fld>
             <a:endParaRPr lang="en-US"/>
           </a:p>
@@ -3070,7 +3070,7 @@
             <a:fld id="{DCCFA427-BB50-4F8D-8FC4-B0EA0BA5795C}" type="datetimeFigureOut">
               <a:rPr lang="en-US" smtClean="0"/>
               <a:pPr/>
-              <a:t>12/7/2016</a:t>
+              <a:t>07/12/2016</a:t>
             </a:fld>
             <a:endParaRPr lang="en-US"/>
           </a:p>
@@ -3466,7 +3466,7 @@
             <a:fld id="{DCCFA427-BB50-4F8D-8FC4-B0EA0BA5795C}" type="datetimeFigureOut">
               <a:rPr lang="en-US" smtClean="0"/>
               <a:pPr/>
-              <a:t>12/7/2016</a:t>
+              <a:t>07/12/2016</a:t>
             </a:fld>
             <a:endParaRPr lang="en-US"/>
           </a:p>
@@ -3781,7 +3781,7 @@
             <a:fld id="{DCCFA427-BB50-4F8D-8FC4-B0EA0BA5795C}" type="datetimeFigureOut">
               <a:rPr lang="en-US" smtClean="0"/>
               <a:pPr/>
-              <a:t>12/7/2016</a:t>
+              <a:t>07/12/2016</a:t>
             </a:fld>
             <a:endParaRPr lang="en-US"/>
           </a:p>
@@ -4320,7 +4320,7 @@
             </a:r>
             <a:r>
               <a:rPr lang="en-US" dirty="0"/>
-              <a:t> bank, Shiran mazor</a:t>
+              <a:t> Bank, Shiran Mazor</a:t>
             </a:r>
           </a:p>
           <a:p>
@@ -4328,18 +4328,9 @@
           </a:p>
           <a:p>
             <a:r>
-              <a:rPr lang="en-US" dirty="0" err="1"/>
-              <a:t>Eylon</a:t>
-            </a:r>
-            <a:r>
               <a:rPr lang="en-US" dirty="0"/>
-              <a:t> </a:t>
-            </a:r>
-            <a:r>
-              <a:rPr lang="en-US" dirty="0" err="1"/>
-              <a:t>saadon</a:t>
-            </a:r>
-            <a:endParaRPr lang="en-US" dirty="0"/>
+              <a:t>Eylon Saadon</a:t>
+            </a:r>
           </a:p>
         </p:txBody>
       </p:sp>
@@ -4395,13 +4386,8 @@
           <a:p>
             <a:r>
               <a:rPr lang="en-US" dirty="0"/>
-              <a:t>Implementation </a:t>
-            </a:r>
-            <a:r>
-              <a:rPr lang="en-US" dirty="0" smtClean="0"/>
-              <a:t>plan (2)</a:t>
-            </a:r>
-            <a:endParaRPr lang="en-US" dirty="0"/>
+              <a:t>Implementation plan (2)</a:t>
+            </a:r>
           </a:p>
         </p:txBody>
       </p:sp>
@@ -4430,9 +4416,27 @@
                 <a:tableStyleId>{5C22544A-7EE6-4342-B048-85BDC9FD1C3A}</a:tableStyleId>
               </a:tblPr>
               <a:tblGrid>
-                <a:gridCol w="3720214"/>
-                <a:gridCol w="6601590"/>
-                <a:gridCol w="838838"/>
+                <a:gridCol w="3720214">
+                  <a:extLst>
+                    <a:ext uri="{9D8B030D-6E8A-4147-A177-3AD203B41FA5}">
+                      <a16:colId xmlns:a16="http://schemas.microsoft.com/office/drawing/2014/main" val="20000"/>
+                    </a:ext>
+                  </a:extLst>
+                </a:gridCol>
+                <a:gridCol w="6601590">
+                  <a:extLst>
+                    <a:ext uri="{9D8B030D-6E8A-4147-A177-3AD203B41FA5}">
+                      <a16:colId xmlns:a16="http://schemas.microsoft.com/office/drawing/2014/main" val="20001"/>
+                    </a:ext>
+                  </a:extLst>
+                </a:gridCol>
+                <a:gridCol w="838838">
+                  <a:extLst>
+                    <a:ext uri="{9D8B030D-6E8A-4147-A177-3AD203B41FA5}">
+                      <a16:colId xmlns:a16="http://schemas.microsoft.com/office/drawing/2014/main" val="20002"/>
+                    </a:ext>
+                  </a:extLst>
+                </a:gridCol>
               </a:tblGrid>
               <a:tr h="285799">
                 <a:tc>
@@ -4441,10 +4445,9 @@
                     <a:lstStyle/>
                     <a:p>
                       <a:r>
-                        <a:rPr lang="en-US" dirty="0" smtClean="0"/>
+                        <a:rPr lang="en-US" dirty="0"/>
                         <a:t>Millstone</a:t>
                       </a:r>
-                      <a:endParaRPr lang="en-US" dirty="0"/>
                     </a:p>
                   </a:txBody>
                   <a:tcPr/>
@@ -4455,10 +4458,9 @@
                     <a:lstStyle/>
                     <a:p>
                       <a:r>
-                        <a:rPr lang="en-US" dirty="0" smtClean="0"/>
+                        <a:rPr lang="en-US" dirty="0"/>
                         <a:t>tasks</a:t>
                       </a:r>
-                      <a:endParaRPr lang="en-US" dirty="0"/>
                     </a:p>
                   </a:txBody>
                   <a:tcPr/>
@@ -4469,14 +4471,18 @@
                     <a:lstStyle/>
                     <a:p>
                       <a:r>
-                        <a:rPr lang="en-US" dirty="0" smtClean="0"/>
+                        <a:rPr lang="en-US" dirty="0"/>
                         <a:t>status</a:t>
                       </a:r>
-                      <a:endParaRPr lang="en-US" dirty="0"/>
                     </a:p>
                   </a:txBody>
                   <a:tcPr/>
                 </a:tc>
+                <a:extLst>
+                  <a:ext uri="{0D108BD9-81ED-4DB2-BD59-A6C34878D82A}">
+                    <a16:rowId xmlns:a16="http://schemas.microsoft.com/office/drawing/2014/main" val="10000"/>
+                  </a:ext>
+                </a:extLst>
               </a:tr>
               <a:tr h="571599">
                 <a:tc rowSpan="4">
@@ -4502,7 +4508,7 @@
                         <a:defRPr/>
                       </a:pPr>
                       <a:r>
-                        <a:rPr lang="en-US" sz="1400" b="1" dirty="0" smtClean="0"/>
+                        <a:rPr lang="en-US" sz="1400" b="1" dirty="0"/>
                         <a:t>Modeling  and Evaluating:</a:t>
                       </a:r>
                     </a:p>
@@ -4535,15 +4541,15 @@
                         <a:defRPr/>
                       </a:pPr>
                       <a:r>
-                        <a:rPr lang="en-US" sz="1400" b="1" dirty="0" smtClean="0"/>
+                        <a:rPr lang="en-US" sz="1400" b="1" dirty="0"/>
                         <a:t>Step 1 - </a:t>
                       </a:r>
                       <a:r>
-                        <a:rPr lang="en-US" sz="1400" b="1" baseline="0" dirty="0" smtClean="0"/>
+                        <a:rPr lang="en-US" sz="1400" b="1" baseline="0" dirty="0"/>
                         <a:t> </a:t>
                       </a:r>
                       <a:r>
-                        <a:rPr lang="en-US" sz="1400" dirty="0" smtClean="0"/>
+                        <a:rPr lang="en-US" sz="1400" dirty="0"/>
                         <a:t>simple linear regression. T-test based feature Removing (manually)</a:t>
                       </a:r>
                     </a:p>
@@ -4563,6 +4569,11 @@
                   </a:txBody>
                   <a:tcPr/>
                 </a:tc>
+                <a:extLst>
+                  <a:ext uri="{0D108BD9-81ED-4DB2-BD59-A6C34878D82A}">
+                    <a16:rowId xmlns:a16="http://schemas.microsoft.com/office/drawing/2014/main" val="10001"/>
+                  </a:ext>
+                </a:extLst>
               </a:tr>
               <a:tr h="469019">
                 <a:tc vMerge="1">
@@ -4587,7 +4598,7 @@
                         <a:tabLst/>
                         <a:defRPr/>
                       </a:pPr>
-                      <a:endParaRPr lang="en-US" sz="1200" b="1" dirty="0" smtClean="0"/>
+                      <a:endParaRPr lang="en-US" sz="1200" b="1" dirty="0"/>
                     </a:p>
                   </a:txBody>
                   <a:tcPr/>
@@ -4615,15 +4626,15 @@
                         <a:defRPr/>
                       </a:pPr>
                       <a:r>
-                        <a:rPr lang="en-US" sz="1400" b="1" dirty="0" smtClean="0"/>
+                        <a:rPr lang="en-US" sz="1400" b="1" dirty="0"/>
                         <a:t>Step 2</a:t>
                       </a:r>
                       <a:r>
-                        <a:rPr lang="en-US" sz="1400" b="1" baseline="0" dirty="0" smtClean="0"/>
+                        <a:rPr lang="en-US" sz="1400" b="1" baseline="0" dirty="0"/>
                         <a:t> - </a:t>
                       </a:r>
                       <a:r>
-                        <a:rPr lang="en-US" sz="1400" dirty="0" smtClean="0"/>
+                        <a:rPr lang="en-US" sz="1400" dirty="0"/>
                         <a:t>L1 regularization for feature selection (lambda by cross validation)</a:t>
                       </a:r>
                     </a:p>
@@ -4645,7 +4656,7 @@
                         <a:tabLst/>
                         <a:defRPr/>
                       </a:pPr>
-                      <a:endParaRPr lang="en-US" sz="1400" b="1" dirty="0" smtClean="0"/>
+                      <a:endParaRPr lang="en-US" sz="1400" b="1" dirty="0"/>
                     </a:p>
                   </a:txBody>
                   <a:tcPr/>
@@ -4660,6 +4671,11 @@
                   </a:txBody>
                   <a:tcPr/>
                 </a:tc>
+                <a:extLst>
+                  <a:ext uri="{0D108BD9-81ED-4DB2-BD59-A6C34878D82A}">
+                    <a16:rowId xmlns:a16="http://schemas.microsoft.com/office/drawing/2014/main" val="10002"/>
+                  </a:ext>
+                </a:extLst>
               </a:tr>
               <a:tr h="605817">
                 <a:tc vMerge="1">
@@ -4684,7 +4700,7 @@
                         <a:tabLst/>
                         <a:defRPr/>
                       </a:pPr>
-                      <a:endParaRPr lang="en-US" sz="1200" b="1" dirty="0" smtClean="0"/>
+                      <a:endParaRPr lang="en-US" sz="1200" b="1" dirty="0"/>
                     </a:p>
                   </a:txBody>
                   <a:tcPr/>
@@ -4712,15 +4728,15 @@
                         <a:defRPr/>
                       </a:pPr>
                       <a:r>
-                        <a:rPr lang="en-US" sz="1400" b="1" dirty="0" smtClean="0"/>
+                        <a:rPr lang="en-US" sz="1400" b="1" dirty="0"/>
                         <a:t>Step 3</a:t>
                       </a:r>
                       <a:r>
-                        <a:rPr lang="en-US" sz="1400" b="1" baseline="0" dirty="0" smtClean="0"/>
+                        <a:rPr lang="en-US" sz="1400" b="1" baseline="0" dirty="0"/>
                         <a:t> - </a:t>
                       </a:r>
                       <a:r>
-                        <a:rPr lang="en-US" sz="1400" dirty="0" smtClean="0"/>
+                        <a:rPr lang="en-US" sz="1400" dirty="0"/>
                         <a:t>data manipulation status - considering cross terms and different missing values system</a:t>
                       </a:r>
                     </a:p>
@@ -4740,6 +4756,11 @@
                   </a:txBody>
                   <a:tcPr/>
                 </a:tc>
+                <a:extLst>
+                  <a:ext uri="{0D108BD9-81ED-4DB2-BD59-A6C34878D82A}">
+                    <a16:rowId xmlns:a16="http://schemas.microsoft.com/office/drawing/2014/main" val="10003"/>
+                  </a:ext>
+                </a:extLst>
               </a:tr>
               <a:tr h="469019">
                 <a:tc vMerge="1">
@@ -4764,7 +4785,7 @@
                         <a:tabLst/>
                         <a:defRPr/>
                       </a:pPr>
-                      <a:endParaRPr lang="en-US" sz="1200" b="1" dirty="0" smtClean="0"/>
+                      <a:endParaRPr lang="en-US" sz="1200" b="1" dirty="0"/>
                     </a:p>
                   </a:txBody>
                   <a:tcPr/>
@@ -4792,11 +4813,11 @@
                         <a:defRPr/>
                       </a:pPr>
                       <a:r>
-                        <a:rPr lang="en-US" sz="1400" b="1" dirty="0" smtClean="0"/>
+                        <a:rPr lang="en-US" sz="1400" b="1" dirty="0"/>
                         <a:t>Step 4</a:t>
                       </a:r>
                       <a:r>
-                        <a:rPr lang="en-US" sz="1400" dirty="0" smtClean="0"/>
+                        <a:rPr lang="en-US" sz="1400" dirty="0"/>
                         <a:t> -considering usage of Random Forest or SVM</a:t>
                       </a:r>
                     </a:p>
@@ -4811,7 +4832,7 @@
                     <a:bodyPr/>
                     <a:lstStyle/>
                     <a:p>
-                      <a:endParaRPr lang="en-US" sz="1400" dirty="0" smtClean="0"/>
+                      <a:endParaRPr lang="en-US" sz="1400" dirty="0"/>
                     </a:p>
                     <a:p>
                       <a:endParaRPr lang="en-US" sz="1400" dirty="0"/>
@@ -4819,6 +4840,11 @@
                   </a:txBody>
                   <a:tcPr/>
                 </a:tc>
+                <a:extLst>
+                  <a:ext uri="{0D108BD9-81ED-4DB2-BD59-A6C34878D82A}">
+                    <a16:rowId xmlns:a16="http://schemas.microsoft.com/office/drawing/2014/main" val="10004"/>
+                  </a:ext>
+                </a:extLst>
               </a:tr>
               <a:tr h="469019">
                 <a:tc>
@@ -4827,10 +4853,9 @@
                     <a:lstStyle/>
                     <a:p>
                       <a:r>
-                        <a:rPr lang="en-US" sz="1400" b="1" dirty="0" smtClean="0"/>
+                        <a:rPr lang="en-US" sz="1400" b="1" dirty="0"/>
                         <a:t>Model Deployment</a:t>
                       </a:r>
-                      <a:endParaRPr lang="en-US" sz="1400" b="1" dirty="0"/>
                     </a:p>
                   </a:txBody>
                   <a:tcPr/>
@@ -4855,6 +4880,11 @@
                   </a:txBody>
                   <a:tcPr/>
                 </a:tc>
+                <a:extLst>
+                  <a:ext uri="{0D108BD9-81ED-4DB2-BD59-A6C34878D82A}">
+                    <a16:rowId xmlns:a16="http://schemas.microsoft.com/office/drawing/2014/main" val="10005"/>
+                  </a:ext>
+                </a:extLst>
               </a:tr>
             </a:tbl>
           </a:graphicData>
@@ -4911,14 +4941,6 @@
               <a:rPr lang="en-US" dirty="0"/>
               <a:t>Business Goal</a:t>
             </a:r>
-            <a:r>
-              <a:rPr lang="en-US" dirty="0">
-                <a:solidFill>
-                  <a:srgbClr val="FF0000"/>
-                </a:solidFill>
-              </a:rPr>
-              <a:t/>
-            </a:r>
             <a:br>
               <a:rPr lang="en-US" dirty="0">
                 <a:solidFill>
@@ -4965,16 +4987,12 @@
               <a:t>Main </a:t>
             </a:r>
             <a:r>
-              <a:rPr lang="en-US" dirty="0" err="1" smtClean="0"/>
+              <a:rPr lang="en-US" dirty="0" err="1"/>
               <a:t>Focuse</a:t>
             </a:r>
             <a:r>
-              <a:rPr lang="en-US" dirty="0" smtClean="0"/>
-              <a:t>– </a:t>
-            </a:r>
-            <a:r>
               <a:rPr lang="en-US" dirty="0"/>
-              <a:t>the value we want to predict  is defined as the difference between median earnings of men and women relative to median earnings of men. (</a:t>
+              <a:t>– the value we want to predict  is defined as the difference between median earnings of men and women relative to median earnings of men. (</a:t>
             </a:r>
             <a:r>
               <a:rPr lang="en-US" b="1" dirty="0"/>
@@ -5081,11 +5099,7 @@
           <a:p>
             <a:r>
               <a:rPr lang="en-US" dirty="0"/>
-              <a:t>World data bank – </a:t>
-            </a:r>
-            <a:r>
-              <a:rPr lang="en-US" dirty="0" smtClean="0"/>
-              <a:t>GenderStat.csv</a:t>
+              <a:t>World data bank – GenderStat.csv</a:t>
             </a:r>
           </a:p>
           <a:p>
@@ -5094,86 +5108,63 @@
               <a:rPr lang="en-US" dirty="0">
                 <a:hlinkClick r:id="rId2"/>
               </a:rPr>
-              <a:t>http://</a:t>
-            </a:r>
-            <a:r>
-              <a:rPr lang="en-US" dirty="0" smtClean="0">
-                <a:hlinkClick r:id="rId2"/>
-              </a:rPr>
-              <a:t>data.worldbank.org/data-catalog/gender-statistics</a:t>
-            </a:r>
-            <a:endParaRPr lang="en-US" dirty="0" smtClean="0"/>
+              <a:t>http://data.worldbank.org/data-catalog/gender-statistics</a:t>
+            </a:r>
+            <a:endParaRPr lang="en-US" dirty="0"/>
           </a:p>
           <a:p>
             <a:pPr lvl="1"/>
             <a:r>
               <a:rPr lang="en-US" dirty="0"/>
-              <a:t>The Gender Statistics database is a comprehensive source for the latest sex-disaggregated data and gender statistics covering demography, education, health, access to economic opportunities, public life and decision-making, and </a:t>
-            </a:r>
-            <a:r>
-              <a:rPr lang="en-US" dirty="0" smtClean="0"/>
-              <a:t>agency</a:t>
+              <a:t>The Gender Statistics database is a comprehensive source for the latest sex-disaggregated data and gender statistics covering demography, education, health, access to economic opportunities, public life and decision-making, and agency</a:t>
             </a:r>
           </a:p>
           <a:p>
             <a:pPr lvl="1"/>
             <a:r>
-              <a:rPr lang="en-US" dirty="0" smtClean="0"/>
-              <a:t>The features statistics are arranged by years </a:t>
-            </a:r>
-            <a:r>
-              <a:rPr lang="en-US" dirty="0" err="1" smtClean="0"/>
-              <a:t>coulmns</a:t>
-            </a:r>
-            <a:r>
-              <a:rPr lang="en-US" dirty="0" smtClean="0"/>
-              <a:t> for each country</a:t>
-            </a:r>
-            <a:endParaRPr lang="en-US" dirty="0"/>
-          </a:p>
-          <a:p>
-            <a:r>
               <a:rPr lang="en-US" dirty="0"/>
-              <a:t>OECD data center – Gender wage gaps (csv</a:t>
-            </a:r>
-            <a:r>
-              <a:rPr lang="en-US" dirty="0" smtClean="0"/>
-              <a:t>)</a:t>
-            </a:r>
-            <a:endParaRPr lang="en-US" dirty="0"/>
+              <a:t>The features statistics are arranged by years columns for each country</a:t>
+            </a:r>
           </a:p>
           <a:p>
             <a:r>
               <a:rPr lang="en-US" dirty="0"/>
-              <a:t>The OECD data will be used as the predicted data, and we will try to build a model relying on the data from the world data bank. At first, we will try to extract features solely from this data</a:t>
-            </a:r>
-            <a:r>
-              <a:rPr lang="en-US" dirty="0" smtClean="0"/>
-              <a:t>.</a:t>
+              <a:t>OECD data center – Gender wage gaps (csv)</a:t>
+            </a:r>
+          </a:p>
+          <a:p>
+            <a:r>
+              <a:rPr lang="en-US" dirty="0"/>
+              <a:t>The OECD data will be used as the predicted data, and we will try to build a model relying on the data from the world data bank. </a:t>
             </a:r>
           </a:p>
           <a:p>
             <a:pPr lvl="1"/>
             <a:r>
-              <a:rPr lang="en-US" dirty="0" smtClean="0"/>
-              <a:t> </a:t>
-            </a:r>
-            <a:r>
               <a:rPr lang="en-US" dirty="0"/>
-              <a:t>Exploration for new data sets will occur after model evaluation  if necessary. </a:t>
-            </a:r>
-            <a:endParaRPr lang="en-US" dirty="0" smtClean="0"/>
+              <a:t> Exploration for new data sets will occur after model evaluation  if necessary. </a:t>
+            </a:r>
           </a:p>
           <a:p>
             <a:pPr lvl="1"/>
             <a:r>
-              <a:rPr lang="en-US" dirty="0" smtClean="0"/>
+              <a:rPr lang="en-US" dirty="0"/>
               <a:t>OECD value meaning </a:t>
             </a:r>
             <a:r>
-              <a:rPr lang="en-US" b="1" dirty="0" smtClean="0"/>
+              <a:rPr lang="en-US" b="1" dirty="0"/>
               <a:t>– the gender wage gap is unadjusted and  defined as the difference  between  male and female median wages divided by the  male median wages</a:t>
             </a:r>
+          </a:p>
+          <a:p>
+            <a:r>
+              <a:rPr lang="en-US" dirty="0"/>
+              <a:t>At first, we will try to extract features solely from this data.</a:t>
+            </a:r>
+            <a:endParaRPr lang="en-US" b="1" dirty="0"/>
+          </a:p>
+          <a:p>
+            <a:pPr lvl="1"/>
             <a:endParaRPr lang="en-US" b="1" dirty="0"/>
           </a:p>
         </p:txBody>
@@ -5391,86 +5382,64 @@
           <a:p>
             <a:r>
               <a:rPr lang="en-US" dirty="0"/>
-              <a:t>Column arrangements (countries – flatten </a:t>
-            </a:r>
-            <a:r>
-              <a:rPr lang="en-US" dirty="0" smtClean="0"/>
-              <a:t>categories, </a:t>
-            </a:r>
+              <a:t>Column arrangements (countries – flatten categories, years – equal fragments)</a:t>
+            </a:r>
+          </a:p>
+          <a:p>
             <a:r>
               <a:rPr lang="en-US" dirty="0"/>
-              <a:t>years – equal </a:t>
-            </a:r>
-            <a:r>
-              <a:rPr lang="en-US" dirty="0" smtClean="0"/>
-              <a:t>fragments)</a:t>
-            </a:r>
+              <a:t>Normalizing –  (Value-min(value)) / (max(value)-min(value))</a:t>
+            </a:r>
+          </a:p>
+          <a:p>
+            <a:r>
+              <a:rPr lang="en-US" dirty="0"/>
+              <a:t>First – </a:t>
+            </a:r>
+            <a:r>
+              <a:rPr lang="en-US" dirty="0" err="1"/>
+              <a:t>GenderStats</a:t>
+            </a:r>
+            <a:r>
+              <a:rPr lang="en-US" dirty="0"/>
+              <a:t> removing rows with null values in all years :</a:t>
+            </a:r>
+          </a:p>
+          <a:p>
             <a:endParaRPr lang="en-US" dirty="0"/>
           </a:p>
           <a:p>
+            <a:endParaRPr lang="en-US" dirty="0"/>
+          </a:p>
+          <a:p>
+            <a:endParaRPr lang="en-US" dirty="0"/>
+          </a:p>
+          <a:p>
             <a:r>
               <a:rPr lang="en-US" dirty="0"/>
-              <a:t>Normalizing –  (Value-min(value)) / (max(value)-min(value</a:t>
-            </a:r>
-            <a:r>
-              <a:rPr lang="en-US" dirty="0" smtClean="0"/>
-              <a:t>))</a:t>
-            </a:r>
-          </a:p>
-          <a:p>
-            <a:r>
-              <a:rPr lang="en-US" dirty="0" smtClean="0"/>
-              <a:t>First – </a:t>
-            </a:r>
-            <a:r>
-              <a:rPr lang="en-US" dirty="0" err="1" smtClean="0"/>
+              <a:t>Intersect years and countries between OECD and </a:t>
+            </a:r>
+            <a:r>
+              <a:rPr lang="en-US" dirty="0" err="1"/>
               <a:t>GenderStats</a:t>
             </a:r>
             <a:r>
-              <a:rPr lang="en-US" dirty="0" smtClean="0"/>
-              <a:t> removing rows with null values in all years </a:t>
-            </a:r>
-            <a:r>
-              <a:rPr lang="en-US" dirty="0" smtClean="0"/>
-              <a:t>:</a:t>
-            </a:r>
-            <a:endParaRPr lang="en-US" dirty="0" smtClean="0"/>
-          </a:p>
-          <a:p>
-            <a:endParaRPr lang="en-US" dirty="0"/>
-          </a:p>
-          <a:p>
-            <a:endParaRPr lang="en-US" dirty="0" smtClean="0"/>
-          </a:p>
-          <a:p>
-            <a:endParaRPr lang="en-US" dirty="0"/>
-          </a:p>
-          <a:p>
-            <a:r>
-              <a:rPr lang="en-US" dirty="0" smtClean="0"/>
-              <a:t>Intersect years and countries between OECD and </a:t>
-            </a:r>
-            <a:r>
-              <a:rPr lang="en-US" dirty="0" err="1" smtClean="0"/>
-              <a:t>GenderStats</a:t>
-            </a:r>
-            <a:r>
-              <a:rPr lang="en-US" dirty="0" smtClean="0"/>
+              <a:rPr lang="en-US" dirty="0"/>
               <a:t>.</a:t>
             </a:r>
           </a:p>
           <a:p>
             <a:r>
-              <a:rPr lang="en-US" dirty="0" smtClean="0"/>
+              <a:rPr lang="en-US" dirty="0"/>
               <a:t>Removing unnecessary columns</a:t>
             </a:r>
-            <a:endParaRPr lang="he-IL" dirty="0" smtClean="0"/>
+            <a:endParaRPr lang="he-IL" dirty="0"/>
           </a:p>
           <a:p>
             <a:pPr marL="0" indent="0">
               <a:buNone/>
             </a:pPr>
-            <a:endParaRPr lang="en-US" dirty="0" smtClean="0"/>
+            <a:endParaRPr lang="en-US" dirty="0"/>
           </a:p>
           <a:p>
             <a:pPr marL="0" indent="0">
@@ -5574,10 +5543,9 @@
           <a:lstStyle/>
           <a:p>
             <a:r>
-              <a:rPr lang="en-US" dirty="0" smtClean="0"/>
+              <a:rPr lang="en-US" dirty="0"/>
               <a:t>Data Preparation 2</a:t>
             </a:r>
-            <a:endParaRPr lang="en-US" dirty="0"/>
           </a:p>
         </p:txBody>
       </p:sp>
@@ -5603,28 +5571,15 @@
           <a:p>
             <a:r>
               <a:rPr lang="en-US" dirty="0"/>
-              <a:t>Current GenderStat.csv after preliminary </a:t>
-            </a:r>
-            <a:r>
-              <a:rPr lang="en-US" dirty="0" smtClean="0"/>
-              <a:t>normalization -</a:t>
-            </a:r>
+              <a:t>Current GenderStat.csv after preliminary normalization -Transpose lines to columns</a:t>
+            </a:r>
+          </a:p>
+          <a:p>
+            <a:pPr lvl="1"/>
             <a:r>
               <a:rPr lang="en-US" dirty="0"/>
-              <a:t>Transpose lines to </a:t>
-            </a:r>
-            <a:r>
-              <a:rPr lang="en-US" dirty="0" smtClean="0"/>
-              <a:t>columns</a:t>
-            </a:r>
-          </a:p>
-          <a:p>
-            <a:pPr lvl="1"/>
-            <a:r>
-              <a:rPr lang="en-US" dirty="0" smtClean="0"/>
               <a:t>  years, country , and indicator are now columns</a:t>
             </a:r>
-            <a:endParaRPr lang="en-US" dirty="0"/>
           </a:p>
           <a:p>
             <a:endParaRPr lang="en-US" dirty="0"/>
@@ -5704,13 +5659,8 @@
           <a:p>
             <a:r>
               <a:rPr lang="en-US" dirty="0"/>
-              <a:t>machine-learning </a:t>
-            </a:r>
-            <a:r>
-              <a:rPr lang="en-US" dirty="0" smtClean="0"/>
-              <a:t>problem</a:t>
-            </a:r>
-            <a:endParaRPr lang="en-US" dirty="0"/>
+              <a:t>machine-learning problem</a:t>
+            </a:r>
           </a:p>
         </p:txBody>
       </p:sp>
@@ -5737,15 +5687,7 @@
           <a:p>
             <a:r>
               <a:rPr lang="en-US" dirty="0"/>
-              <a:t>Will calculate for each state and average them </a:t>
-            </a:r>
-            <a:r>
-              <a:rPr lang="en-US" dirty="0" smtClean="0"/>
-              <a:t>deterministically </a:t>
-            </a:r>
-            <a:r>
-              <a:rPr lang="en-US" dirty="0"/>
-              <a:t>(for unbiased estimates – immediate variance reduction)</a:t>
+              <a:t>Will calculate for each state and average them deterministically (for unbiased estimates – immediate variance reduction)</a:t>
             </a:r>
           </a:p>
         </p:txBody>
@@ -5819,64 +5761,41 @@
           <a:p>
             <a:r>
               <a:rPr lang="en-US" dirty="0"/>
-              <a:t>Many missing Values</a:t>
-            </a:r>
-            <a:r>
-              <a:rPr lang="en-US" dirty="0" smtClean="0"/>
-              <a:t>!</a:t>
+              <a:t>Many missing Values!</a:t>
             </a:r>
           </a:p>
           <a:p>
             <a:pPr lvl="1"/>
             <a:r>
               <a:rPr lang="en-US" dirty="0"/>
-              <a:t>Too many</a:t>
-            </a:r>
-            <a:r>
-              <a:rPr lang="en-US" dirty="0" smtClean="0"/>
-              <a:t>!</a:t>
-            </a:r>
-            <a:endParaRPr lang="en-US" dirty="0"/>
+              <a:t>Too many!</a:t>
+            </a:r>
           </a:p>
           <a:p>
             <a:pPr lvl="1"/>
             <a:r>
-              <a:rPr lang="en-US" dirty="0" smtClean="0"/>
-              <a:t>First </a:t>
-            </a:r>
-            <a:r>
               <a:rPr lang="en-US" dirty="0"/>
-              <a:t>removing the sparse ones without mining context </a:t>
-            </a:r>
-            <a:endParaRPr lang="en-US" dirty="0" smtClean="0"/>
+              <a:t>First removing the sparse ones without mining context </a:t>
+            </a:r>
           </a:p>
           <a:p>
             <a:pPr lvl="1"/>
             <a:r>
-              <a:rPr lang="en-US" dirty="0" smtClean="0"/>
+              <a:rPr lang="en-US" dirty="0"/>
               <a:t>First version:  median</a:t>
             </a:r>
           </a:p>
           <a:p>
             <a:pPr lvl="1"/>
             <a:r>
-              <a:rPr lang="en-US" dirty="0" smtClean="0"/>
-              <a:t>Second </a:t>
-            </a:r>
-            <a:r>
               <a:rPr lang="en-US" dirty="0"/>
-              <a:t>version: finding similar countries with similar values </a:t>
-            </a:r>
-            <a:endParaRPr lang="en-US" dirty="0" smtClean="0"/>
-          </a:p>
-          <a:p>
-            <a:r>
-              <a:rPr lang="en-US" dirty="0" smtClean="0"/>
-              <a:t>Not </a:t>
-            </a:r>
+              <a:t>Second version: finding similar countries with similar values </a:t>
+            </a:r>
+          </a:p>
+          <a:p>
             <a:r>
               <a:rPr lang="en-US" dirty="0"/>
-              <a:t>normalized.</a:t>
+              <a:t>Not normalized.</a:t>
             </a:r>
           </a:p>
           <a:p>
@@ -5935,13 +5854,8 @@
           <a:p>
             <a:r>
               <a:rPr lang="en-US" dirty="0"/>
-              <a:t>Implementation </a:t>
-            </a:r>
-            <a:r>
-              <a:rPr lang="en-US" dirty="0" smtClean="0"/>
-              <a:t>plan</a:t>
-            </a:r>
-            <a:endParaRPr lang="en-US" dirty="0"/>
+              <a:t>Implementation plan</a:t>
+            </a:r>
           </a:p>
         </p:txBody>
       </p:sp>
@@ -5954,7 +5868,7 @@
           <p:nvPr>
             <p:extLst>
               <p:ext uri="{D42A27DB-BD31-4B8C-83A1-F6EECF244321}">
-                <p14:modId xmlns:p14="http://schemas.microsoft.com/office/powerpoint/2010/main" val="1351954597"/>
+                <p14:modId xmlns:p14="http://schemas.microsoft.com/office/powerpoint/2010/main" val="3848875132"/>
               </p:ext>
             </p:extLst>
           </p:nvPr>
@@ -5970,9 +5884,27 @@
                 <a:tableStyleId>{5C22544A-7EE6-4342-B048-85BDC9FD1C3A}</a:tableStyleId>
               </a:tblPr>
               <a:tblGrid>
-                <a:gridCol w="3720214"/>
-                <a:gridCol w="6601590"/>
-                <a:gridCol w="838838"/>
+                <a:gridCol w="3720214">
+                  <a:extLst>
+                    <a:ext uri="{9D8B030D-6E8A-4147-A177-3AD203B41FA5}">
+                      <a16:colId xmlns:a16="http://schemas.microsoft.com/office/drawing/2014/main" val="20000"/>
+                    </a:ext>
+                  </a:extLst>
+                </a:gridCol>
+                <a:gridCol w="6601590">
+                  <a:extLst>
+                    <a:ext uri="{9D8B030D-6E8A-4147-A177-3AD203B41FA5}">
+                      <a16:colId xmlns:a16="http://schemas.microsoft.com/office/drawing/2014/main" val="20001"/>
+                    </a:ext>
+                  </a:extLst>
+                </a:gridCol>
+                <a:gridCol w="838838">
+                  <a:extLst>
+                    <a:ext uri="{9D8B030D-6E8A-4147-A177-3AD203B41FA5}">
+                      <a16:colId xmlns:a16="http://schemas.microsoft.com/office/drawing/2014/main" val="20002"/>
+                    </a:ext>
+                  </a:extLst>
+                </a:gridCol>
               </a:tblGrid>
               <a:tr h="285799">
                 <a:tc>
@@ -5981,10 +5913,9 @@
                     <a:lstStyle/>
                     <a:p>
                       <a:r>
-                        <a:rPr lang="en-US" dirty="0" smtClean="0"/>
+                        <a:rPr lang="en-US" dirty="0"/>
                         <a:t>Millstone</a:t>
                       </a:r>
-                      <a:endParaRPr lang="en-US" dirty="0"/>
                     </a:p>
                   </a:txBody>
                   <a:tcPr/>
@@ -5995,10 +5926,9 @@
                     <a:lstStyle/>
                     <a:p>
                       <a:r>
-                        <a:rPr lang="en-US" dirty="0" smtClean="0"/>
+                        <a:rPr lang="en-US" dirty="0"/>
                         <a:t>tasks</a:t>
                       </a:r>
-                      <a:endParaRPr lang="en-US" dirty="0"/>
                     </a:p>
                   </a:txBody>
                   <a:tcPr/>
@@ -6009,14 +5939,18 @@
                     <a:lstStyle/>
                     <a:p>
                       <a:r>
-                        <a:rPr lang="en-US" dirty="0" smtClean="0"/>
+                        <a:rPr lang="en-US" dirty="0"/>
                         <a:t>status</a:t>
                       </a:r>
-                      <a:endParaRPr lang="en-US" dirty="0"/>
                     </a:p>
                   </a:txBody>
                   <a:tcPr/>
                 </a:tc>
+                <a:extLst>
+                  <a:ext uri="{0D108BD9-81ED-4DB2-BD59-A6C34878D82A}">
+                    <a16:rowId xmlns:a16="http://schemas.microsoft.com/office/drawing/2014/main" val="10000"/>
+                  </a:ext>
+                </a:extLst>
               </a:tr>
               <a:tr h="238166">
                 <a:tc rowSpan="2">
@@ -6025,10 +5959,9 @@
                     <a:lstStyle/>
                     <a:p>
                       <a:r>
-                        <a:rPr lang="en-US" sz="1400" b="1" dirty="0" smtClean="0"/>
+                        <a:rPr lang="en-US" sz="1400" b="1" dirty="0"/>
                         <a:t>Business understanding</a:t>
                       </a:r>
-                      <a:endParaRPr lang="en-US" sz="1400" b="1" dirty="0"/>
                     </a:p>
                   </a:txBody>
                   <a:tcPr/>
@@ -6039,11 +5972,11 @@
                     <a:lstStyle/>
                     <a:p>
                       <a:r>
-                        <a:rPr lang="en-US" sz="1400" dirty="0" smtClean="0"/>
+                        <a:rPr lang="en-US" sz="1400" dirty="0"/>
                         <a:t>Search</a:t>
                       </a:r>
                       <a:r>
-                        <a:rPr lang="en-US" sz="1400" baseline="0" dirty="0" smtClean="0"/>
+                        <a:rPr lang="en-US" sz="1400" baseline="0" dirty="0"/>
                         <a:t> salary and gender statistics</a:t>
                       </a:r>
                       <a:endParaRPr lang="en-US" sz="1400" dirty="0"/>
@@ -6057,14 +5990,18 @@
                     <a:lstStyle/>
                     <a:p>
                       <a:r>
-                        <a:rPr lang="en-US" sz="1400" dirty="0" smtClean="0"/>
+                        <a:rPr lang="en-US" sz="1400" dirty="0"/>
                         <a:t>Done.</a:t>
                       </a:r>
-                      <a:endParaRPr lang="en-US" sz="1400" dirty="0"/>
                     </a:p>
                   </a:txBody>
                   <a:tcPr/>
                 </a:tc>
+                <a:extLst>
+                  <a:ext uri="{0D108BD9-81ED-4DB2-BD59-A6C34878D82A}">
+                    <a16:rowId xmlns:a16="http://schemas.microsoft.com/office/drawing/2014/main" val="10001"/>
+                  </a:ext>
+                </a:extLst>
               </a:tr>
               <a:tr h="238166">
                 <a:tc vMerge="1">
@@ -6083,10 +6020,9 @@
                     <a:lstStyle/>
                     <a:p>
                       <a:r>
-                        <a:rPr lang="en-US" sz="1400" dirty="0" smtClean="0"/>
+                        <a:rPr lang="en-US" sz="1400" dirty="0"/>
                         <a:t>Defining the problem </a:t>
                       </a:r>
-                      <a:endParaRPr lang="en-US" sz="1400" dirty="0"/>
                     </a:p>
                   </a:txBody>
                   <a:tcPr/>
@@ -6097,14 +6033,18 @@
                     <a:lstStyle/>
                     <a:p>
                       <a:r>
-                        <a:rPr lang="en-US" sz="1400" dirty="0" smtClean="0"/>
+                        <a:rPr lang="en-US" sz="1400" dirty="0"/>
                         <a:t>Done.</a:t>
                       </a:r>
-                      <a:endParaRPr lang="en-US" sz="1400" dirty="0"/>
                     </a:p>
                   </a:txBody>
                   <a:tcPr/>
                 </a:tc>
+                <a:extLst>
+                  <a:ext uri="{0D108BD9-81ED-4DB2-BD59-A6C34878D82A}">
+                    <a16:rowId xmlns:a16="http://schemas.microsoft.com/office/drawing/2014/main" val="10002"/>
+                  </a:ext>
+                </a:extLst>
               </a:tr>
               <a:tr h="332222">
                 <a:tc>
@@ -6113,10 +6053,9 @@
                     <a:lstStyle/>
                     <a:p>
                       <a:r>
-                        <a:rPr lang="en-US" sz="1400" b="1" dirty="0" smtClean="0"/>
+                        <a:rPr lang="en-US" sz="1400" b="1" dirty="0"/>
                         <a:t>Data understanding </a:t>
                       </a:r>
-                      <a:endParaRPr lang="en-US" sz="1400" b="1" dirty="0"/>
                     </a:p>
                   </a:txBody>
                   <a:tcPr/>
@@ -6127,27 +6066,27 @@
                     <a:lstStyle/>
                     <a:p>
                       <a:r>
-                        <a:rPr lang="en-US" sz="1400" dirty="0" smtClean="0"/>
+                        <a:rPr lang="en-US" sz="1400" dirty="0"/>
                         <a:t>Focused on </a:t>
                       </a:r>
                       <a:r>
-                        <a:rPr lang="en-US" sz="1400" dirty="0" err="1" smtClean="0"/>
+                        <a:rPr lang="en-US" sz="1400" dirty="0" err="1"/>
                         <a:t>GenderStats</a:t>
                       </a:r>
                       <a:r>
-                        <a:rPr lang="en-US" sz="1400" dirty="0" smtClean="0"/>
+                        <a:rPr lang="en-US" sz="1400" dirty="0"/>
                         <a:t>,</a:t>
                       </a:r>
                       <a:r>
-                        <a:rPr lang="en-US" sz="1400" baseline="0" dirty="0" smtClean="0"/>
+                        <a:rPr lang="en-US" sz="1400" baseline="0" dirty="0"/>
                         <a:t> </a:t>
                       </a:r>
                       <a:r>
-                        <a:rPr lang="en-US" sz="1400" baseline="0" dirty="0" err="1" smtClean="0"/>
+                        <a:rPr lang="en-US" sz="1400" baseline="0" dirty="0" err="1"/>
                         <a:t>Sallary</a:t>
                       </a:r>
                       <a:r>
-                        <a:rPr lang="en-US" sz="1400" baseline="0" dirty="0" smtClean="0"/>
+                        <a:rPr lang="en-US" sz="1400" baseline="0" dirty="0"/>
                         <a:t> gap csv on  OECD </a:t>
                       </a:r>
                       <a:endParaRPr lang="en-US" sz="1400" dirty="0"/>
@@ -6178,13 +6117,18 @@
                         <a:defRPr/>
                       </a:pPr>
                       <a:r>
-                        <a:rPr lang="en-US" sz="1400" dirty="0" smtClean="0"/>
+                        <a:rPr lang="en-US" sz="1400" dirty="0"/>
                         <a:t>Done.</a:t>
                       </a:r>
                     </a:p>
                   </a:txBody>
                   <a:tcPr/>
                 </a:tc>
+                <a:extLst>
+                  <a:ext uri="{0D108BD9-81ED-4DB2-BD59-A6C34878D82A}">
+                    <a16:rowId xmlns:a16="http://schemas.microsoft.com/office/drawing/2014/main" val="10003"/>
+                  </a:ext>
+                </a:extLst>
               </a:tr>
               <a:tr h="469019">
                 <a:tc rowSpan="6">
@@ -6193,10 +6137,9 @@
                     <a:lstStyle/>
                     <a:p>
                       <a:r>
-                        <a:rPr lang="en-US" sz="1400" b="1" dirty="0" smtClean="0"/>
+                        <a:rPr lang="en-US" sz="1400" b="1" dirty="0"/>
                         <a:t>Data preparation &amp; cleaning</a:t>
                       </a:r>
-                      <a:endParaRPr lang="en-US" sz="1400" b="1" dirty="0"/>
                     </a:p>
                   </a:txBody>
                   <a:tcPr/>
@@ -6207,15 +6150,15 @@
                     <a:lstStyle/>
                     <a:p>
                       <a:r>
-                        <a:rPr lang="en-US" sz="1400" dirty="0" err="1" smtClean="0"/>
+                        <a:rPr lang="en-US" sz="1400" dirty="0" err="1"/>
                         <a:t>GenderStats</a:t>
                       </a:r>
                       <a:r>
-                        <a:rPr lang="en-US" sz="1400" dirty="0" smtClean="0"/>
+                        <a:rPr lang="en-US" sz="1400" dirty="0"/>
                         <a:t> - Remove fully empty lines , convert</a:t>
                       </a:r>
                       <a:r>
-                        <a:rPr lang="en-US" sz="1400" baseline="0" dirty="0" smtClean="0"/>
+                        <a:rPr lang="en-US" sz="1400" baseline="0" dirty="0"/>
                         <a:t> Countries, indicators to columns</a:t>
                       </a:r>
                       <a:endParaRPr lang="en-US" sz="1400" dirty="0"/>
@@ -6246,7 +6189,7 @@
                         <a:defRPr/>
                       </a:pPr>
                       <a:r>
-                        <a:rPr lang="en-US" sz="1400" dirty="0" smtClean="0"/>
+                        <a:rPr lang="en-US" sz="1400" dirty="0"/>
                         <a:t>Done.</a:t>
                       </a:r>
                     </a:p>
@@ -6256,6 +6199,11 @@
                   </a:txBody>
                   <a:tcPr/>
                 </a:tc>
+                <a:extLst>
+                  <a:ext uri="{0D108BD9-81ED-4DB2-BD59-A6C34878D82A}">
+                    <a16:rowId xmlns:a16="http://schemas.microsoft.com/office/drawing/2014/main" val="10004"/>
+                  </a:ext>
+                </a:extLst>
               </a:tr>
               <a:tr h="469019">
                 <a:tc vMerge="1">
@@ -6274,11 +6222,11 @@
                     <a:lstStyle/>
                     <a:p>
                       <a:r>
-                        <a:rPr lang="en-US" sz="1400" dirty="0" smtClean="0"/>
+                        <a:rPr lang="en-US" sz="1400" dirty="0"/>
                         <a:t>Transpose lines</a:t>
                       </a:r>
                       <a:r>
-                        <a:rPr lang="en-US" sz="1400" baseline="0" dirty="0" smtClean="0"/>
+                        <a:rPr lang="en-US" sz="1400" baseline="0" dirty="0"/>
                         <a:t> to columns  - years and country are columns</a:t>
                       </a:r>
                       <a:endParaRPr lang="en-US" sz="1400" dirty="0"/>
@@ -6291,11 +6239,19 @@
                     <a:bodyPr/>
                     <a:lstStyle/>
                     <a:p>
-                      <a:endParaRPr lang="en-US" sz="1400" dirty="0"/>
+                      <a:r>
+                        <a:rPr lang="en-US" sz="1400" dirty="0"/>
+                        <a:t>Done</a:t>
+                      </a:r>
                     </a:p>
                   </a:txBody>
                   <a:tcPr/>
                 </a:tc>
+                <a:extLst>
+                  <a:ext uri="{0D108BD9-81ED-4DB2-BD59-A6C34878D82A}">
+                    <a16:rowId xmlns:a16="http://schemas.microsoft.com/office/drawing/2014/main" val="10005"/>
+                  </a:ext>
+                </a:extLst>
               </a:tr>
               <a:tr h="404883">
                 <a:tc vMerge="1">
@@ -6314,11 +6270,11 @@
                     <a:lstStyle/>
                     <a:p>
                       <a:r>
-                        <a:rPr lang="en-US" sz="1400" dirty="0" smtClean="0"/>
+                        <a:rPr lang="en-US" sz="1400" dirty="0"/>
                         <a:t>Remove irrelevant</a:t>
                       </a:r>
                       <a:r>
-                        <a:rPr lang="en-US" sz="1400" baseline="0" dirty="0" smtClean="0"/>
+                        <a:rPr lang="en-US" sz="1400" baseline="0" dirty="0"/>
                         <a:t> columns from both csv’s</a:t>
                       </a:r>
                       <a:endParaRPr lang="en-US" sz="1400" dirty="0"/>
@@ -6349,7 +6305,7 @@
                         <a:defRPr/>
                       </a:pPr>
                       <a:r>
-                        <a:rPr lang="en-US" sz="1400" dirty="0" smtClean="0"/>
+                        <a:rPr lang="en-US" sz="1400" dirty="0"/>
                         <a:t>Done.</a:t>
                       </a:r>
                     </a:p>
@@ -6359,6 +6315,11 @@
                   </a:txBody>
                   <a:tcPr/>
                 </a:tc>
+                <a:extLst>
+                  <a:ext uri="{0D108BD9-81ED-4DB2-BD59-A6C34878D82A}">
+                    <a16:rowId xmlns:a16="http://schemas.microsoft.com/office/drawing/2014/main" val="10006"/>
+                  </a:ext>
+                </a:extLst>
               </a:tr>
               <a:tr h="332222">
                 <a:tc vMerge="1">
@@ -6394,14 +6355,14 @@
                         <a:defRPr/>
                       </a:pPr>
                       <a:r>
-                        <a:rPr lang="en-US" sz="1400" dirty="0" smtClean="0"/>
+                        <a:rPr lang="en-US" sz="1400" dirty="0"/>
                         <a:t>Intersect  between</a:t>
                       </a:r>
                       <a:r>
-                        <a:rPr lang="en-US" sz="1400" baseline="0" dirty="0" smtClean="0"/>
+                        <a:rPr lang="en-US" sz="1400" baseline="0" dirty="0"/>
                         <a:t> countries and years</a:t>
                       </a:r>
-                      <a:endParaRPr lang="en-US" sz="1400" dirty="0" smtClean="0"/>
+                      <a:endParaRPr lang="en-US" sz="1400" dirty="0"/>
                     </a:p>
                   </a:txBody>
                   <a:tcPr/>
@@ -6416,6 +6377,11 @@
                   </a:txBody>
                   <a:tcPr/>
                 </a:tc>
+                <a:extLst>
+                  <a:ext uri="{0D108BD9-81ED-4DB2-BD59-A6C34878D82A}">
+                    <a16:rowId xmlns:a16="http://schemas.microsoft.com/office/drawing/2014/main" val="10007"/>
+                  </a:ext>
+                </a:extLst>
               </a:tr>
               <a:tr h="332222">
                 <a:tc vMerge="1">
@@ -6434,23 +6400,23 @@
                     <a:lstStyle/>
                     <a:p>
                       <a:r>
-                        <a:rPr lang="en-US" sz="1400" dirty="0" smtClean="0"/>
+                        <a:rPr lang="en-US" sz="1400" dirty="0"/>
                         <a:t>Merge </a:t>
                       </a:r>
                       <a:r>
-                        <a:rPr lang="en-US" sz="1400" dirty="0" err="1" smtClean="0"/>
+                        <a:rPr lang="en-US" sz="1400" dirty="0" err="1"/>
                         <a:t>oecd</a:t>
                       </a:r>
                       <a:r>
-                        <a:rPr lang="en-US" sz="1400" baseline="0" dirty="0" smtClean="0"/>
+                        <a:rPr lang="en-US" sz="1400" baseline="0" dirty="0"/>
                         <a:t> data and </a:t>
                       </a:r>
                       <a:r>
-                        <a:rPr lang="en-US" sz="1400" baseline="0" dirty="0" err="1" smtClean="0"/>
+                        <a:rPr lang="en-US" sz="1400" baseline="0" dirty="0" err="1"/>
                         <a:t>GenderStats</a:t>
                       </a:r>
                       <a:r>
-                        <a:rPr lang="en-US" sz="1400" baseline="0" dirty="0" smtClean="0"/>
+                        <a:rPr lang="en-US" sz="1400" baseline="0" dirty="0"/>
                         <a:t> csv</a:t>
                       </a:r>
                       <a:endParaRPr lang="en-US" sz="1400" dirty="0"/>
@@ -6468,6 +6434,11 @@
                   </a:txBody>
                   <a:tcPr/>
                 </a:tc>
+                <a:extLst>
+                  <a:ext uri="{0D108BD9-81ED-4DB2-BD59-A6C34878D82A}">
+                    <a16:rowId xmlns:a16="http://schemas.microsoft.com/office/drawing/2014/main" val="10008"/>
+                  </a:ext>
+                </a:extLst>
               </a:tr>
               <a:tr h="332222">
                 <a:tc vMerge="1">
@@ -6486,11 +6457,11 @@
                     <a:lstStyle/>
                     <a:p>
                       <a:r>
-                        <a:rPr lang="en-US" sz="1400" dirty="0" smtClean="0"/>
+                        <a:rPr lang="en-US" sz="1400" dirty="0"/>
                         <a:t>complete missing values</a:t>
                       </a:r>
                       <a:r>
-                        <a:rPr lang="en-US" sz="1400" baseline="0" dirty="0" smtClean="0"/>
+                        <a:rPr lang="en-US" sz="1400" baseline="0" dirty="0"/>
                         <a:t> </a:t>
                       </a:r>
                       <a:endParaRPr lang="en-US" sz="1400" dirty="0"/>
@@ -6508,6 +6479,11 @@
                   </a:txBody>
                   <a:tcPr/>
                 </a:tc>
+                <a:extLst>
+                  <a:ext uri="{0D108BD9-81ED-4DB2-BD59-A6C34878D82A}">
+                    <a16:rowId xmlns:a16="http://schemas.microsoft.com/office/drawing/2014/main" val="10009"/>
+                  </a:ext>
+                </a:extLst>
               </a:tr>
               <a:tr h="332222">
                 <a:tc>
@@ -6533,7 +6509,7 @@
                         <a:defRPr/>
                       </a:pPr>
                       <a:r>
-                        <a:rPr lang="en-US" sz="1400" b="1" dirty="0" smtClean="0"/>
+                        <a:rPr lang="en-US" sz="1400" b="1" dirty="0"/>
                         <a:t>Data Analysis</a:t>
                       </a:r>
                     </a:p>
@@ -6549,10 +6525,9 @@
                     <a:lstStyle/>
                     <a:p>
                       <a:r>
-                        <a:rPr lang="en-US" sz="1400" dirty="0" smtClean="0"/>
+                        <a:rPr lang="en-US" sz="1400" dirty="0"/>
                         <a:t>Defining train and test data</a:t>
                       </a:r>
-                      <a:endParaRPr lang="en-US" sz="1400" dirty="0"/>
                     </a:p>
                   </a:txBody>
                   <a:tcPr/>
@@ -6567,6 +6542,11 @@
                   </a:txBody>
                   <a:tcPr/>
                 </a:tc>
+                <a:extLst>
+                  <a:ext uri="{0D108BD9-81ED-4DB2-BD59-A6C34878D82A}">
+                    <a16:rowId xmlns:a16="http://schemas.microsoft.com/office/drawing/2014/main" val="10010"/>
+                  </a:ext>
+                </a:extLst>
               </a:tr>
               <a:tr h="332222">
                 <a:tc>
@@ -6585,10 +6565,9 @@
                     <a:lstStyle/>
                     <a:p>
                       <a:r>
-                        <a:rPr lang="en-US" sz="1400" dirty="0" smtClean="0"/>
+                        <a:rPr lang="en-US" sz="1400" dirty="0"/>
                         <a:t>Select and normalize features (by correlation) </a:t>
                       </a:r>
-                      <a:endParaRPr lang="en-US" sz="1400" dirty="0"/>
                     </a:p>
                   </a:txBody>
                   <a:tcPr/>
@@ -6603,6 +6582,11 @@
                   </a:txBody>
                   <a:tcPr/>
                 </a:tc>
+                <a:extLst>
+                  <a:ext uri="{0D108BD9-81ED-4DB2-BD59-A6C34878D82A}">
+                    <a16:rowId xmlns:a16="http://schemas.microsoft.com/office/drawing/2014/main" val="10011"/>
+                  </a:ext>
+                </a:extLst>
               </a:tr>
             </a:tbl>
           </a:graphicData>

</xml_diff>

<commit_message>
new presentation from Shiran
</commit_message>
<xml_diff>
--- a/Sallary gap predictionfrom Project Demo.pptx
+++ b/Sallary gap predictionfrom Project Demo.pptx
@@ -115,7 +115,7 @@
   </p:defaultTextStyle>
   <p:extLst>
     <p:ext uri="{EFAFB233-063F-42B5-8137-9DF3F51BA10A}">
-      <p15:sldGuideLst xmlns:p15="http://schemas.microsoft.com/office/powerpoint/2012/main">
+      <p15:sldGuideLst xmlns:p15="http://schemas.microsoft.com/office/powerpoint/2012/main" xmlns="">
         <p15:guide id="1" orient="horz" pos="2160">
           <p15:clr>
             <a:srgbClr val="A4A3A4"/>
@@ -595,7 +595,7 @@
             <a:fld id="{DCCFA427-BB50-4F8D-8FC4-B0EA0BA5795C}" type="datetimeFigureOut">
               <a:rPr lang="en-US" smtClean="0"/>
               <a:pPr/>
-              <a:t>07/12/2016</a:t>
+              <a:t>12/10/2016</a:t>
             </a:fld>
             <a:endParaRPr lang="en-US"/>
           </a:p>
@@ -679,7 +679,7 @@
     </p:spTree>
     <p:extLst>
       <p:ext uri="{BB962C8B-B14F-4D97-AF65-F5344CB8AC3E}">
-        <p14:creationId xmlns:p14="http://schemas.microsoft.com/office/powerpoint/2010/main" val="254611623"/>
+        <p14:creationId xmlns:p14="http://schemas.microsoft.com/office/powerpoint/2010/main" xmlns="" val="254611623"/>
       </p:ext>
     </p:extLst>
   </p:cSld>
@@ -799,7 +799,7 @@
             <a:fld id="{DCCFA427-BB50-4F8D-8FC4-B0EA0BA5795C}" type="datetimeFigureOut">
               <a:rPr lang="en-US" smtClean="0"/>
               <a:pPr/>
-              <a:t>07/12/2016</a:t>
+              <a:t>12/10/2016</a:t>
             </a:fld>
             <a:endParaRPr lang="en-US"/>
           </a:p>
@@ -851,7 +851,7 @@
     </p:spTree>
     <p:extLst>
       <p:ext uri="{BB962C8B-B14F-4D97-AF65-F5344CB8AC3E}">
-        <p14:creationId xmlns:p14="http://schemas.microsoft.com/office/powerpoint/2010/main" val="2716736531"/>
+        <p14:creationId xmlns:p14="http://schemas.microsoft.com/office/powerpoint/2010/main" xmlns="" val="2716736531"/>
       </p:ext>
     </p:extLst>
   </p:cSld>
@@ -981,7 +981,7 @@
             <a:fld id="{DCCFA427-BB50-4F8D-8FC4-B0EA0BA5795C}" type="datetimeFigureOut">
               <a:rPr lang="en-US" smtClean="0"/>
               <a:pPr/>
-              <a:t>07/12/2016</a:t>
+              <a:t>12/10/2016</a:t>
             </a:fld>
             <a:endParaRPr lang="en-US"/>
           </a:p>
@@ -1033,7 +1033,7 @@
     </p:spTree>
     <p:extLst>
       <p:ext uri="{BB962C8B-B14F-4D97-AF65-F5344CB8AC3E}">
-        <p14:creationId xmlns:p14="http://schemas.microsoft.com/office/powerpoint/2010/main" val="2604561829"/>
+        <p14:creationId xmlns:p14="http://schemas.microsoft.com/office/powerpoint/2010/main" xmlns="" val="2604561829"/>
       </p:ext>
     </p:extLst>
   </p:cSld>
@@ -1153,7 +1153,7 @@
             <a:fld id="{DCCFA427-BB50-4F8D-8FC4-B0EA0BA5795C}" type="datetimeFigureOut">
               <a:rPr lang="en-US" smtClean="0"/>
               <a:pPr/>
-              <a:t>07/12/2016</a:t>
+              <a:t>12/10/2016</a:t>
             </a:fld>
             <a:endParaRPr lang="en-US"/>
           </a:p>
@@ -1205,7 +1205,7 @@
     </p:spTree>
     <p:extLst>
       <p:ext uri="{BB962C8B-B14F-4D97-AF65-F5344CB8AC3E}">
-        <p14:creationId xmlns:p14="http://schemas.microsoft.com/office/powerpoint/2010/main" val="2263785529"/>
+        <p14:creationId xmlns:p14="http://schemas.microsoft.com/office/powerpoint/2010/main" xmlns="" val="2263785529"/>
       </p:ext>
     </p:extLst>
   </p:cSld>
@@ -1726,7 +1726,7 @@
             <a:fld id="{DCCFA427-BB50-4F8D-8FC4-B0EA0BA5795C}" type="datetimeFigureOut">
               <a:rPr lang="en-US" smtClean="0"/>
               <a:pPr/>
-              <a:t>07/12/2016</a:t>
+              <a:t>12/10/2016</a:t>
             </a:fld>
             <a:endParaRPr lang="en-US"/>
           </a:p>
@@ -1792,7 +1792,7 @@
     </p:spTree>
     <p:extLst>
       <p:ext uri="{BB962C8B-B14F-4D97-AF65-F5344CB8AC3E}">
-        <p14:creationId xmlns:p14="http://schemas.microsoft.com/office/powerpoint/2010/main" val="1591096940"/>
+        <p14:creationId xmlns:p14="http://schemas.microsoft.com/office/powerpoint/2010/main" xmlns="" val="1591096940"/>
       </p:ext>
     </p:extLst>
   </p:cSld>
@@ -2030,7 +2030,7 @@
             <a:fld id="{DCCFA427-BB50-4F8D-8FC4-B0EA0BA5795C}" type="datetimeFigureOut">
               <a:rPr lang="en-US" smtClean="0"/>
               <a:pPr/>
-              <a:t>07/12/2016</a:t>
+              <a:t>12/10/2016</a:t>
             </a:fld>
             <a:endParaRPr lang="en-US"/>
           </a:p>
@@ -2082,7 +2082,7 @@
     </p:spTree>
     <p:extLst>
       <p:ext uri="{BB962C8B-B14F-4D97-AF65-F5344CB8AC3E}">
-        <p14:creationId xmlns:p14="http://schemas.microsoft.com/office/powerpoint/2010/main" val="4104223766"/>
+        <p14:creationId xmlns:p14="http://schemas.microsoft.com/office/powerpoint/2010/main" xmlns="" val="4104223766"/>
       </p:ext>
     </p:extLst>
   </p:cSld>
@@ -2469,7 +2469,7 @@
             <a:fld id="{DCCFA427-BB50-4F8D-8FC4-B0EA0BA5795C}" type="datetimeFigureOut">
               <a:rPr lang="en-US" smtClean="0"/>
               <a:pPr/>
-              <a:t>07/12/2016</a:t>
+              <a:t>12/10/2016</a:t>
             </a:fld>
             <a:endParaRPr lang="en-US"/>
           </a:p>
@@ -2521,7 +2521,7 @@
     </p:spTree>
     <p:extLst>
       <p:ext uri="{BB962C8B-B14F-4D97-AF65-F5344CB8AC3E}">
-        <p14:creationId xmlns:p14="http://schemas.microsoft.com/office/powerpoint/2010/main" val="2670169739"/>
+        <p14:creationId xmlns:p14="http://schemas.microsoft.com/office/powerpoint/2010/main" xmlns="" val="2670169739"/>
       </p:ext>
     </p:extLst>
   </p:cSld>
@@ -2589,7 +2589,7 @@
             <a:fld id="{DCCFA427-BB50-4F8D-8FC4-B0EA0BA5795C}" type="datetimeFigureOut">
               <a:rPr lang="en-US" smtClean="0"/>
               <a:pPr/>
-              <a:t>07/12/2016</a:t>
+              <a:t>12/10/2016</a:t>
             </a:fld>
             <a:endParaRPr lang="en-US"/>
           </a:p>
@@ -2641,7 +2641,7 @@
     </p:spTree>
     <p:extLst>
       <p:ext uri="{BB962C8B-B14F-4D97-AF65-F5344CB8AC3E}">
-        <p14:creationId xmlns:p14="http://schemas.microsoft.com/office/powerpoint/2010/main" val="1477665264"/>
+        <p14:creationId xmlns:p14="http://schemas.microsoft.com/office/powerpoint/2010/main" xmlns="" val="1477665264"/>
       </p:ext>
     </p:extLst>
   </p:cSld>
@@ -2686,7 +2686,7 @@
             <a:fld id="{DCCFA427-BB50-4F8D-8FC4-B0EA0BA5795C}" type="datetimeFigureOut">
               <a:rPr lang="en-US" smtClean="0"/>
               <a:pPr/>
-              <a:t>07/12/2016</a:t>
+              <a:t>12/10/2016</a:t>
             </a:fld>
             <a:endParaRPr lang="en-US"/>
           </a:p>
@@ -2738,7 +2738,7 @@
     </p:spTree>
     <p:extLst>
       <p:ext uri="{BB962C8B-B14F-4D97-AF65-F5344CB8AC3E}">
-        <p14:creationId xmlns:p14="http://schemas.microsoft.com/office/powerpoint/2010/main" val="2711781868"/>
+        <p14:creationId xmlns:p14="http://schemas.microsoft.com/office/powerpoint/2010/main" xmlns="" val="2711781868"/>
       </p:ext>
     </p:extLst>
   </p:cSld>
@@ -3070,7 +3070,7 @@
             <a:fld id="{DCCFA427-BB50-4F8D-8FC4-B0EA0BA5795C}" type="datetimeFigureOut">
               <a:rPr lang="en-US" smtClean="0"/>
               <a:pPr/>
-              <a:t>07/12/2016</a:t>
+              <a:t>12/10/2016</a:t>
             </a:fld>
             <a:endParaRPr lang="en-US"/>
           </a:p>
@@ -3178,7 +3178,7 @@
     </p:spTree>
     <p:extLst>
       <p:ext uri="{BB962C8B-B14F-4D97-AF65-F5344CB8AC3E}">
-        <p14:creationId xmlns:p14="http://schemas.microsoft.com/office/powerpoint/2010/main" val="1977218180"/>
+        <p14:creationId xmlns:p14="http://schemas.microsoft.com/office/powerpoint/2010/main" xmlns="" val="1977218180"/>
       </p:ext>
     </p:extLst>
   </p:cSld>
@@ -3466,7 +3466,7 @@
             <a:fld id="{DCCFA427-BB50-4F8D-8FC4-B0EA0BA5795C}" type="datetimeFigureOut">
               <a:rPr lang="en-US" smtClean="0"/>
               <a:pPr/>
-              <a:t>07/12/2016</a:t>
+              <a:t>12/10/2016</a:t>
             </a:fld>
             <a:endParaRPr lang="en-US"/>
           </a:p>
@@ -3588,7 +3588,7 @@
     </p:spTree>
     <p:extLst>
       <p:ext uri="{BB962C8B-B14F-4D97-AF65-F5344CB8AC3E}">
-        <p14:creationId xmlns:p14="http://schemas.microsoft.com/office/powerpoint/2010/main" val="2602728310"/>
+        <p14:creationId xmlns:p14="http://schemas.microsoft.com/office/powerpoint/2010/main" xmlns="" val="2602728310"/>
       </p:ext>
     </p:extLst>
   </p:cSld>
@@ -3781,7 +3781,7 @@
             <a:fld id="{DCCFA427-BB50-4F8D-8FC4-B0EA0BA5795C}" type="datetimeFigureOut">
               <a:rPr lang="en-US" smtClean="0"/>
               <a:pPr/>
-              <a:t>07/12/2016</a:t>
+              <a:t>12/10/2016</a:t>
             </a:fld>
             <a:endParaRPr lang="en-US"/>
           </a:p>
@@ -3871,7 +3871,7 @@
     </p:spTree>
     <p:extLst>
       <p:ext uri="{BB962C8B-B14F-4D97-AF65-F5344CB8AC3E}">
-        <p14:creationId xmlns:p14="http://schemas.microsoft.com/office/powerpoint/2010/main" val="4097071133"/>
+        <p14:creationId xmlns:p14="http://schemas.microsoft.com/office/powerpoint/2010/main" xmlns="" val="4097071133"/>
       </p:ext>
     </p:extLst>
   </p:cSld>
@@ -4337,7 +4337,7 @@
     </p:spTree>
     <p:extLst>
       <p:ext uri="{BB962C8B-B14F-4D97-AF65-F5344CB8AC3E}">
-        <p14:creationId xmlns:p14="http://schemas.microsoft.com/office/powerpoint/2010/main" val="3364559204"/>
+        <p14:creationId xmlns:p14="http://schemas.microsoft.com/office/powerpoint/2010/main" xmlns="" val="3364559204"/>
       </p:ext>
     </p:extLst>
   </p:cSld>
@@ -4400,7 +4400,7 @@
           <p:nvPr>
             <p:extLst>
               <p:ext uri="{D42A27DB-BD31-4B8C-83A1-F6EECF244321}">
-                <p14:modId xmlns:p14="http://schemas.microsoft.com/office/powerpoint/2010/main" val="2305459994"/>
+                <p14:modId xmlns:p14="http://schemas.microsoft.com/office/powerpoint/2010/main" xmlns="" val="2305459994"/>
               </p:ext>
             </p:extLst>
           </p:nvPr>
@@ -4419,21 +4419,21 @@
                 <a:gridCol w="3720214">
                   <a:extLst>
                     <a:ext uri="{9D8B030D-6E8A-4147-A177-3AD203B41FA5}">
-                      <a16:colId xmlns:a16="http://schemas.microsoft.com/office/drawing/2014/main" val="20000"/>
+                      <a16:colId xmlns:a16="http://schemas.microsoft.com/office/drawing/2014/main" xmlns="" val="20000"/>
                     </a:ext>
                   </a:extLst>
                 </a:gridCol>
                 <a:gridCol w="6601590">
                   <a:extLst>
                     <a:ext uri="{9D8B030D-6E8A-4147-A177-3AD203B41FA5}">
-                      <a16:colId xmlns:a16="http://schemas.microsoft.com/office/drawing/2014/main" val="20001"/>
+                      <a16:colId xmlns:a16="http://schemas.microsoft.com/office/drawing/2014/main" xmlns="" val="20001"/>
                     </a:ext>
                   </a:extLst>
                 </a:gridCol>
                 <a:gridCol w="838838">
                   <a:extLst>
                     <a:ext uri="{9D8B030D-6E8A-4147-A177-3AD203B41FA5}">
-                      <a16:colId xmlns:a16="http://schemas.microsoft.com/office/drawing/2014/main" val="20002"/>
+                      <a16:colId xmlns:a16="http://schemas.microsoft.com/office/drawing/2014/main" xmlns="" val="20002"/>
                     </a:ext>
                   </a:extLst>
                 </a:gridCol>
@@ -4480,7 +4480,7 @@
                 </a:tc>
                 <a:extLst>
                   <a:ext uri="{0D108BD9-81ED-4DB2-BD59-A6C34878D82A}">
-                    <a16:rowId xmlns:a16="http://schemas.microsoft.com/office/drawing/2014/main" val="10000"/>
+                    <a16:rowId xmlns:a16="http://schemas.microsoft.com/office/drawing/2014/main" xmlns="" val="10000"/>
                   </a:ext>
                 </a:extLst>
               </a:tr>
@@ -4571,7 +4571,7 @@
                 </a:tc>
                 <a:extLst>
                   <a:ext uri="{0D108BD9-81ED-4DB2-BD59-A6C34878D82A}">
-                    <a16:rowId xmlns:a16="http://schemas.microsoft.com/office/drawing/2014/main" val="10001"/>
+                    <a16:rowId xmlns:a16="http://schemas.microsoft.com/office/drawing/2014/main" xmlns="" val="10001"/>
                   </a:ext>
                 </a:extLst>
               </a:tr>
@@ -4673,7 +4673,7 @@
                 </a:tc>
                 <a:extLst>
                   <a:ext uri="{0D108BD9-81ED-4DB2-BD59-A6C34878D82A}">
-                    <a16:rowId xmlns:a16="http://schemas.microsoft.com/office/drawing/2014/main" val="10002"/>
+                    <a16:rowId xmlns:a16="http://schemas.microsoft.com/office/drawing/2014/main" xmlns="" val="10002"/>
                   </a:ext>
                 </a:extLst>
               </a:tr>
@@ -4758,7 +4758,7 @@
                 </a:tc>
                 <a:extLst>
                   <a:ext uri="{0D108BD9-81ED-4DB2-BD59-A6C34878D82A}">
-                    <a16:rowId xmlns:a16="http://schemas.microsoft.com/office/drawing/2014/main" val="10003"/>
+                    <a16:rowId xmlns:a16="http://schemas.microsoft.com/office/drawing/2014/main" xmlns="" val="10003"/>
                   </a:ext>
                 </a:extLst>
               </a:tr>
@@ -4842,7 +4842,7 @@
                 </a:tc>
                 <a:extLst>
                   <a:ext uri="{0D108BD9-81ED-4DB2-BD59-A6C34878D82A}">
-                    <a16:rowId xmlns:a16="http://schemas.microsoft.com/office/drawing/2014/main" val="10004"/>
+                    <a16:rowId xmlns:a16="http://schemas.microsoft.com/office/drawing/2014/main" xmlns="" val="10004"/>
                   </a:ext>
                 </a:extLst>
               </a:tr>
@@ -4882,7 +4882,7 @@
                 </a:tc>
                 <a:extLst>
                   <a:ext uri="{0D108BD9-81ED-4DB2-BD59-A6C34878D82A}">
-                    <a16:rowId xmlns:a16="http://schemas.microsoft.com/office/drawing/2014/main" val="10005"/>
+                    <a16:rowId xmlns:a16="http://schemas.microsoft.com/office/drawing/2014/main" xmlns="" val="10005"/>
                   </a:ext>
                 </a:extLst>
               </a:tr>
@@ -4893,7 +4893,7 @@
     </p:spTree>
     <p:extLst>
       <p:ext uri="{BB962C8B-B14F-4D97-AF65-F5344CB8AC3E}">
-        <p14:creationId xmlns:p14="http://schemas.microsoft.com/office/powerpoint/2010/main" val="1364573028"/>
+        <p14:creationId xmlns:p14="http://schemas.microsoft.com/office/powerpoint/2010/main" xmlns="" val="1364573028"/>
       </p:ext>
     </p:extLst>
   </p:cSld>
@@ -4941,6 +4941,14 @@
               <a:rPr lang="en-US" dirty="0"/>
               <a:t>Business Goal</a:t>
             </a:r>
+            <a:r>
+              <a:rPr lang="en-US" dirty="0">
+                <a:solidFill>
+                  <a:srgbClr val="FF0000"/>
+                </a:solidFill>
+              </a:rPr>
+              <a:t/>
+            </a:r>
             <a:br>
               <a:rPr lang="en-US" dirty="0">
                 <a:solidFill>
@@ -5017,7 +5025,7 @@
     </p:spTree>
     <p:extLst>
       <p:ext uri="{BB962C8B-B14F-4D97-AF65-F5344CB8AC3E}">
-        <p14:creationId xmlns:p14="http://schemas.microsoft.com/office/powerpoint/2010/main" val="488657827"/>
+        <p14:creationId xmlns:p14="http://schemas.microsoft.com/office/powerpoint/2010/main" xmlns="" val="488657827"/>
       </p:ext>
     </p:extLst>
   </p:cSld>
@@ -5172,7 +5180,7 @@
     </p:spTree>
     <p:extLst>
       <p:ext uri="{BB962C8B-B14F-4D97-AF65-F5344CB8AC3E}">
-        <p14:creationId xmlns:p14="http://schemas.microsoft.com/office/powerpoint/2010/main" val="184644264"/>
+        <p14:creationId xmlns:p14="http://schemas.microsoft.com/office/powerpoint/2010/main" xmlns="" val="184644264"/>
       </p:ext>
     </p:extLst>
   </p:cSld>
@@ -5243,7 +5251,7 @@
           <p:nvPr/>
         </p:nvPicPr>
         <p:blipFill>
-          <a:blip r:embed="rId2"/>
+          <a:blip r:embed="rId2" cstate="print"/>
           <a:stretch>
             <a:fillRect/>
           </a:stretch>
@@ -5269,7 +5277,7 @@
           </p:nvPr>
         </p:nvPicPr>
         <p:blipFill>
-          <a:blip r:embed="rId3"/>
+          <a:blip r:embed="rId3" cstate="print"/>
           <a:stretch>
             <a:fillRect/>
           </a:stretch>
@@ -5293,7 +5301,7 @@
           <p:nvPr/>
         </p:nvPicPr>
         <p:blipFill>
-          <a:blip r:embed="rId4"/>
+          <a:blip r:embed="rId4" cstate="print"/>
           <a:stretch>
             <a:fillRect/>
           </a:stretch>
@@ -5311,7 +5319,7 @@
     </p:spTree>
     <p:extLst>
       <p:ext uri="{BB962C8B-B14F-4D97-AF65-F5344CB8AC3E}">
-        <p14:creationId xmlns:p14="http://schemas.microsoft.com/office/powerpoint/2010/main" val="1136635159"/>
+        <p14:creationId xmlns:p14="http://schemas.microsoft.com/office/powerpoint/2010/main" xmlns="" val="1136635159"/>
       </p:ext>
     </p:extLst>
   </p:cSld>
@@ -5458,7 +5466,7 @@
           <p:nvPr/>
         </p:nvPicPr>
         <p:blipFill>
-          <a:blip r:embed="rId2"/>
+          <a:blip r:embed="rId2" cstate="print"/>
           <a:stretch>
             <a:fillRect/>
           </a:stretch>
@@ -5482,7 +5490,7 @@
           <p:nvPr/>
         </p:nvPicPr>
         <p:blipFill>
-          <a:blip r:embed="rId3"/>
+          <a:blip r:embed="rId3" cstate="print"/>
           <a:stretch>
             <a:fillRect/>
           </a:stretch>
@@ -5500,7 +5508,7 @@
     </p:spTree>
     <p:extLst>
       <p:ext uri="{BB962C8B-B14F-4D97-AF65-F5344CB8AC3E}">
-        <p14:creationId xmlns:p14="http://schemas.microsoft.com/office/powerpoint/2010/main" val="3021417476"/>
+        <p14:creationId xmlns:p14="http://schemas.microsoft.com/office/powerpoint/2010/main" xmlns="" val="3021417476"/>
       </p:ext>
     </p:extLst>
   </p:cSld>
@@ -5595,7 +5603,7 @@
           <p:nvPr/>
         </p:nvPicPr>
         <p:blipFill>
-          <a:blip r:embed="rId2"/>
+          <a:blip r:embed="rId2" cstate="print"/>
           <a:stretch>
             <a:fillRect/>
           </a:stretch>
@@ -5613,7 +5621,7 @@
     </p:spTree>
     <p:extLst>
       <p:ext uri="{BB962C8B-B14F-4D97-AF65-F5344CB8AC3E}">
-        <p14:creationId xmlns:p14="http://schemas.microsoft.com/office/powerpoint/2010/main" val="3663174221"/>
+        <p14:creationId xmlns:p14="http://schemas.microsoft.com/office/powerpoint/2010/main" xmlns="" val="3663174221"/>
       </p:ext>
     </p:extLst>
   </p:cSld>
@@ -5653,14 +5661,19 @@
         <p:spPr/>
         <p:txBody>
           <a:bodyPr>
-            <a:normAutofit/>
+            <a:normAutofit fontScale="90000"/>
           </a:bodyPr>
           <a:lstStyle/>
           <a:p>
             <a:r>
               <a:rPr lang="en-US" dirty="0"/>
-              <a:t>machine-learning problem</a:t>
-            </a:r>
+              <a:t>machine-learning </a:t>
+            </a:r>
+            <a:r>
+              <a:rPr lang="en-US" dirty="0" smtClean="0"/>
+              <a:t>problem product</a:t>
+            </a:r>
+            <a:endParaRPr lang="en-US" dirty="0"/>
           </a:p>
         </p:txBody>
       </p:sp>
@@ -5680,14 +5693,65 @@
           <a:lstStyle/>
           <a:p>
             <a:r>
-              <a:rPr lang="en-US" dirty="0"/>
-              <a:t>Predicting average gender wage gap in the OECD</a:t>
-            </a:r>
-          </a:p>
-          <a:p>
-            <a:r>
-              <a:rPr lang="en-US" dirty="0"/>
-              <a:t>Will calculate for each state and average them deterministically (for unbiased estimates – immediate variance reduction)</a:t>
+              <a:rPr lang="en-US" dirty="0" smtClean="0"/>
+              <a:t>Currently:</a:t>
+            </a:r>
+          </a:p>
+          <a:p>
+            <a:pPr lvl="1"/>
+            <a:r>
+              <a:rPr lang="en-US" dirty="0" smtClean="0"/>
+              <a:t>Input: vector consisting year, country and selected features</a:t>
+            </a:r>
+          </a:p>
+          <a:p>
+            <a:pPr lvl="1"/>
+            <a:r>
+              <a:rPr lang="en-US" dirty="0" smtClean="0"/>
+              <a:t>Output: gap prediction between the median </a:t>
+            </a:r>
+            <a:r>
+              <a:rPr lang="en-US" dirty="0" err="1" smtClean="0"/>
+              <a:t>sallaries</a:t>
+            </a:r>
+            <a:endParaRPr lang="en-US" dirty="0" smtClean="0"/>
+          </a:p>
+          <a:p>
+            <a:endParaRPr lang="en-US" dirty="0" smtClean="0"/>
+          </a:p>
+          <a:p>
+            <a:r>
+              <a:rPr lang="en-US" dirty="0" smtClean="0"/>
+              <a:t>Optional:</a:t>
+            </a:r>
+          </a:p>
+          <a:p>
+            <a:pPr lvl="1"/>
+            <a:r>
+              <a:rPr lang="en-US" dirty="0" smtClean="0"/>
+              <a:t>Input: matrix for all 35 countries and a specified year</a:t>
+            </a:r>
+          </a:p>
+          <a:p>
+            <a:pPr lvl="1"/>
+            <a:r>
+              <a:rPr lang="en-US" dirty="0" smtClean="0"/>
+              <a:t>Output: averaged </a:t>
+            </a:r>
+            <a:r>
+              <a:rPr lang="en-US" dirty="0" err="1" smtClean="0"/>
+              <a:t>sallery</a:t>
+            </a:r>
+            <a:r>
+              <a:rPr lang="en-US" dirty="0" smtClean="0"/>
+              <a:t> gap. </a:t>
+            </a:r>
+          </a:p>
+          <a:p>
+            <a:pPr lvl="1"/>
+            <a:r>
+              <a:rPr lang="en-US" dirty="0" smtClean="0"/>
+              <a:t>reduced variance assuming unbiased estimate</a:t>
             </a:r>
           </a:p>
         </p:txBody>
@@ -5695,7 +5759,7 @@
     </p:spTree>
     <p:extLst>
       <p:ext uri="{BB962C8B-B14F-4D97-AF65-F5344CB8AC3E}">
-        <p14:creationId xmlns:p14="http://schemas.microsoft.com/office/powerpoint/2010/main" val="2506240783"/>
+        <p14:creationId xmlns:p14="http://schemas.microsoft.com/office/powerpoint/2010/main" xmlns="" val="2506240783"/>
       </p:ext>
     </p:extLst>
   </p:cSld>
@@ -5810,7 +5874,7 @@
     </p:spTree>
     <p:extLst>
       <p:ext uri="{BB962C8B-B14F-4D97-AF65-F5344CB8AC3E}">
-        <p14:creationId xmlns:p14="http://schemas.microsoft.com/office/powerpoint/2010/main" val="1864583965"/>
+        <p14:creationId xmlns:p14="http://schemas.microsoft.com/office/powerpoint/2010/main" xmlns="" val="1864583965"/>
       </p:ext>
     </p:extLst>
   </p:cSld>
@@ -5868,7 +5932,7 @@
           <p:nvPr>
             <p:extLst>
               <p:ext uri="{D42A27DB-BD31-4B8C-83A1-F6EECF244321}">
-                <p14:modId xmlns:p14="http://schemas.microsoft.com/office/powerpoint/2010/main" val="3848875132"/>
+                <p14:modId xmlns:p14="http://schemas.microsoft.com/office/powerpoint/2010/main" xmlns="" val="3848875132"/>
               </p:ext>
             </p:extLst>
           </p:nvPr>
@@ -5887,21 +5951,21 @@
                 <a:gridCol w="3720214">
                   <a:extLst>
                     <a:ext uri="{9D8B030D-6E8A-4147-A177-3AD203B41FA5}">
-                      <a16:colId xmlns:a16="http://schemas.microsoft.com/office/drawing/2014/main" val="20000"/>
+                      <a16:colId xmlns:a16="http://schemas.microsoft.com/office/drawing/2014/main" xmlns="" val="20000"/>
                     </a:ext>
                   </a:extLst>
                 </a:gridCol>
                 <a:gridCol w="6601590">
                   <a:extLst>
                     <a:ext uri="{9D8B030D-6E8A-4147-A177-3AD203B41FA5}">
-                      <a16:colId xmlns:a16="http://schemas.microsoft.com/office/drawing/2014/main" val="20001"/>
+                      <a16:colId xmlns:a16="http://schemas.microsoft.com/office/drawing/2014/main" xmlns="" val="20001"/>
                     </a:ext>
                   </a:extLst>
                 </a:gridCol>
                 <a:gridCol w="838838">
                   <a:extLst>
                     <a:ext uri="{9D8B030D-6E8A-4147-A177-3AD203B41FA5}">
-                      <a16:colId xmlns:a16="http://schemas.microsoft.com/office/drawing/2014/main" val="20002"/>
+                      <a16:colId xmlns:a16="http://schemas.microsoft.com/office/drawing/2014/main" xmlns="" val="20002"/>
                     </a:ext>
                   </a:extLst>
                 </a:gridCol>
@@ -5948,7 +6012,7 @@
                 </a:tc>
                 <a:extLst>
                   <a:ext uri="{0D108BD9-81ED-4DB2-BD59-A6C34878D82A}">
-                    <a16:rowId xmlns:a16="http://schemas.microsoft.com/office/drawing/2014/main" val="10000"/>
+                    <a16:rowId xmlns:a16="http://schemas.microsoft.com/office/drawing/2014/main" xmlns="" val="10000"/>
                   </a:ext>
                 </a:extLst>
               </a:tr>
@@ -5999,7 +6063,7 @@
                 </a:tc>
                 <a:extLst>
                   <a:ext uri="{0D108BD9-81ED-4DB2-BD59-A6C34878D82A}">
-                    <a16:rowId xmlns:a16="http://schemas.microsoft.com/office/drawing/2014/main" val="10001"/>
+                    <a16:rowId xmlns:a16="http://schemas.microsoft.com/office/drawing/2014/main" xmlns="" val="10001"/>
                   </a:ext>
                 </a:extLst>
               </a:tr>
@@ -6042,7 +6106,7 @@
                 </a:tc>
                 <a:extLst>
                   <a:ext uri="{0D108BD9-81ED-4DB2-BD59-A6C34878D82A}">
-                    <a16:rowId xmlns:a16="http://schemas.microsoft.com/office/drawing/2014/main" val="10002"/>
+                    <a16:rowId xmlns:a16="http://schemas.microsoft.com/office/drawing/2014/main" xmlns="" val="10002"/>
                   </a:ext>
                 </a:extLst>
               </a:tr>
@@ -6126,7 +6190,7 @@
                 </a:tc>
                 <a:extLst>
                   <a:ext uri="{0D108BD9-81ED-4DB2-BD59-A6C34878D82A}">
-                    <a16:rowId xmlns:a16="http://schemas.microsoft.com/office/drawing/2014/main" val="10003"/>
+                    <a16:rowId xmlns:a16="http://schemas.microsoft.com/office/drawing/2014/main" xmlns="" val="10003"/>
                   </a:ext>
                 </a:extLst>
               </a:tr>
@@ -6201,7 +6265,7 @@
                 </a:tc>
                 <a:extLst>
                   <a:ext uri="{0D108BD9-81ED-4DB2-BD59-A6C34878D82A}">
-                    <a16:rowId xmlns:a16="http://schemas.microsoft.com/office/drawing/2014/main" val="10004"/>
+                    <a16:rowId xmlns:a16="http://schemas.microsoft.com/office/drawing/2014/main" xmlns="" val="10004"/>
                   </a:ext>
                 </a:extLst>
               </a:tr>
@@ -6249,7 +6313,7 @@
                 </a:tc>
                 <a:extLst>
                   <a:ext uri="{0D108BD9-81ED-4DB2-BD59-A6C34878D82A}">
-                    <a16:rowId xmlns:a16="http://schemas.microsoft.com/office/drawing/2014/main" val="10005"/>
+                    <a16:rowId xmlns:a16="http://schemas.microsoft.com/office/drawing/2014/main" xmlns="" val="10005"/>
                   </a:ext>
                 </a:extLst>
               </a:tr>
@@ -6317,7 +6381,7 @@
                 </a:tc>
                 <a:extLst>
                   <a:ext uri="{0D108BD9-81ED-4DB2-BD59-A6C34878D82A}">
-                    <a16:rowId xmlns:a16="http://schemas.microsoft.com/office/drawing/2014/main" val="10006"/>
+                    <a16:rowId xmlns:a16="http://schemas.microsoft.com/office/drawing/2014/main" xmlns="" val="10006"/>
                   </a:ext>
                 </a:extLst>
               </a:tr>
@@ -6379,7 +6443,7 @@
                 </a:tc>
                 <a:extLst>
                   <a:ext uri="{0D108BD9-81ED-4DB2-BD59-A6C34878D82A}">
-                    <a16:rowId xmlns:a16="http://schemas.microsoft.com/office/drawing/2014/main" val="10007"/>
+                    <a16:rowId xmlns:a16="http://schemas.microsoft.com/office/drawing/2014/main" xmlns="" val="10007"/>
                   </a:ext>
                 </a:extLst>
               </a:tr>
@@ -6436,7 +6500,7 @@
                 </a:tc>
                 <a:extLst>
                   <a:ext uri="{0D108BD9-81ED-4DB2-BD59-A6C34878D82A}">
-                    <a16:rowId xmlns:a16="http://schemas.microsoft.com/office/drawing/2014/main" val="10008"/>
+                    <a16:rowId xmlns:a16="http://schemas.microsoft.com/office/drawing/2014/main" xmlns="" val="10008"/>
                   </a:ext>
                 </a:extLst>
               </a:tr>
@@ -6481,7 +6545,7 @@
                 </a:tc>
                 <a:extLst>
                   <a:ext uri="{0D108BD9-81ED-4DB2-BD59-A6C34878D82A}">
-                    <a16:rowId xmlns:a16="http://schemas.microsoft.com/office/drawing/2014/main" val="10009"/>
+                    <a16:rowId xmlns:a16="http://schemas.microsoft.com/office/drawing/2014/main" xmlns="" val="10009"/>
                   </a:ext>
                 </a:extLst>
               </a:tr>
@@ -6544,7 +6608,7 @@
                 </a:tc>
                 <a:extLst>
                   <a:ext uri="{0D108BD9-81ED-4DB2-BD59-A6C34878D82A}">
-                    <a16:rowId xmlns:a16="http://schemas.microsoft.com/office/drawing/2014/main" val="10010"/>
+                    <a16:rowId xmlns:a16="http://schemas.microsoft.com/office/drawing/2014/main" xmlns="" val="10010"/>
                   </a:ext>
                 </a:extLst>
               </a:tr>
@@ -6584,7 +6648,7 @@
                 </a:tc>
                 <a:extLst>
                   <a:ext uri="{0D108BD9-81ED-4DB2-BD59-A6C34878D82A}">
-                    <a16:rowId xmlns:a16="http://schemas.microsoft.com/office/drawing/2014/main" val="10011"/>
+                    <a16:rowId xmlns:a16="http://schemas.microsoft.com/office/drawing/2014/main" xmlns="" val="10011"/>
                   </a:ext>
                 </a:extLst>
               </a:tr>
@@ -6627,7 +6691,7 @@
     </p:spTree>
     <p:extLst>
       <p:ext uri="{BB962C8B-B14F-4D97-AF65-F5344CB8AC3E}">
-        <p14:creationId xmlns:p14="http://schemas.microsoft.com/office/powerpoint/2010/main" val="1937447193"/>
+        <p14:creationId xmlns:p14="http://schemas.microsoft.com/office/powerpoint/2010/main" xmlns="" val="1937447193"/>
       </p:ext>
     </p:extLst>
   </p:cSld>
@@ -6912,7 +6976,7 @@
   <a:extraClrSchemeLst/>
   <a:extLst>
     <a:ext uri="{05A4C25C-085E-4340-85A3-A5531E510DB2}">
-      <thm15:themeFamily xmlns:thm15="http://schemas.microsoft.com/office/thememl/2012/main" name="Savon" id="{1306E473-ED32-493B-A2D0-240A757EDD34}" vid="{C20BADFE-D095-436F-9677-9264042809F0}"/>
+      <thm15:themeFamily xmlns:thm15="http://schemas.microsoft.com/office/thememl/2012/main" xmlns="" name="Savon" id="{1306E473-ED32-493B-A2D0-240A757EDD34}" vid="{C20BADFE-D095-436F-9677-9264042809F0}"/>
     </a:ext>
   </a:extLst>
 </a:theme>

</xml_diff>